<commit_message>
Added an example of a base edtiro nuclease
</commit_message>
<xml_diff>
--- a/vignettes/figures/nucleasesBaseEditor.pptx
+++ b/vignettes/figures/nucleasesBaseEditor.pptx
@@ -197,7 +197,7 @@
           <a:p>
             <a:fld id="{F1A348B4-9975-524C-BE6E-E74FD2A3F22C}" type="datetimeFigureOut">
               <a:rPr lang="en-US" smtClean="0"/>
-              <a:t>1/2/22</a:t>
+              <a:t>1/4/22</a:t>
             </a:fld>
             <a:endParaRPr lang="en-US"/>
           </a:p>
@@ -684,7 +684,7 @@
           <a:p>
             <a:fld id="{DD6D9246-4FED-8E4D-BC9B-CDD794F2A5B7}" type="datetimeFigureOut">
               <a:rPr lang="en-US" smtClean="0"/>
-              <a:t>1/2/22</a:t>
+              <a:t>1/4/22</a:t>
             </a:fld>
             <a:endParaRPr lang="en-US"/>
           </a:p>
@@ -854,7 +854,7 @@
           <a:p>
             <a:fld id="{DD6D9246-4FED-8E4D-BC9B-CDD794F2A5B7}" type="datetimeFigureOut">
               <a:rPr lang="en-US" smtClean="0"/>
-              <a:t>1/2/22</a:t>
+              <a:t>1/4/22</a:t>
             </a:fld>
             <a:endParaRPr lang="en-US"/>
           </a:p>
@@ -1034,7 +1034,7 @@
           <a:p>
             <a:fld id="{DD6D9246-4FED-8E4D-BC9B-CDD794F2A5B7}" type="datetimeFigureOut">
               <a:rPr lang="en-US" smtClean="0"/>
-              <a:t>1/2/22</a:t>
+              <a:t>1/4/22</a:t>
             </a:fld>
             <a:endParaRPr lang="en-US"/>
           </a:p>
@@ -1204,7 +1204,7 @@
           <a:p>
             <a:fld id="{DD6D9246-4FED-8E4D-BC9B-CDD794F2A5B7}" type="datetimeFigureOut">
               <a:rPr lang="en-US" smtClean="0"/>
-              <a:t>1/2/22</a:t>
+              <a:t>1/4/22</a:t>
             </a:fld>
             <a:endParaRPr lang="en-US"/>
           </a:p>
@@ -1450,7 +1450,7 @@
           <a:p>
             <a:fld id="{DD6D9246-4FED-8E4D-BC9B-CDD794F2A5B7}" type="datetimeFigureOut">
               <a:rPr lang="en-US" smtClean="0"/>
-              <a:t>1/2/22</a:t>
+              <a:t>1/4/22</a:t>
             </a:fld>
             <a:endParaRPr lang="en-US"/>
           </a:p>
@@ -1682,7 +1682,7 @@
           <a:p>
             <a:fld id="{DD6D9246-4FED-8E4D-BC9B-CDD794F2A5B7}" type="datetimeFigureOut">
               <a:rPr lang="en-US" smtClean="0"/>
-              <a:t>1/2/22</a:t>
+              <a:t>1/4/22</a:t>
             </a:fld>
             <a:endParaRPr lang="en-US"/>
           </a:p>
@@ -2049,7 +2049,7 @@
           <a:p>
             <a:fld id="{DD6D9246-4FED-8E4D-BC9B-CDD794F2A5B7}" type="datetimeFigureOut">
               <a:rPr lang="en-US" smtClean="0"/>
-              <a:t>1/2/22</a:t>
+              <a:t>1/4/22</a:t>
             </a:fld>
             <a:endParaRPr lang="en-US"/>
           </a:p>
@@ -2167,7 +2167,7 @@
           <a:p>
             <a:fld id="{DD6D9246-4FED-8E4D-BC9B-CDD794F2A5B7}" type="datetimeFigureOut">
               <a:rPr lang="en-US" smtClean="0"/>
-              <a:t>1/2/22</a:t>
+              <a:t>1/4/22</a:t>
             </a:fld>
             <a:endParaRPr lang="en-US"/>
           </a:p>
@@ -2262,7 +2262,7 @@
           <a:p>
             <a:fld id="{DD6D9246-4FED-8E4D-BC9B-CDD794F2A5B7}" type="datetimeFigureOut">
               <a:rPr lang="en-US" smtClean="0"/>
-              <a:t>1/2/22</a:t>
+              <a:t>1/4/22</a:t>
             </a:fld>
             <a:endParaRPr lang="en-US"/>
           </a:p>
@@ -2539,7 +2539,7 @@
           <a:p>
             <a:fld id="{DD6D9246-4FED-8E4D-BC9B-CDD794F2A5B7}" type="datetimeFigureOut">
               <a:rPr lang="en-US" smtClean="0"/>
-              <a:t>1/2/22</a:t>
+              <a:t>1/4/22</a:t>
             </a:fld>
             <a:endParaRPr lang="en-US"/>
           </a:p>
@@ -2796,7 +2796,7 @@
           <a:p>
             <a:fld id="{DD6D9246-4FED-8E4D-BC9B-CDD794F2A5B7}" type="datetimeFigureOut">
               <a:rPr lang="en-US" smtClean="0"/>
-              <a:t>1/2/22</a:t>
+              <a:t>1/4/22</a:t>
             </a:fld>
             <a:endParaRPr lang="en-US"/>
           </a:p>
@@ -3009,7 +3009,7 @@
           <a:p>
             <a:fld id="{DD6D9246-4FED-8E4D-BC9B-CDD794F2A5B7}" type="datetimeFigureOut">
               <a:rPr lang="en-US" smtClean="0"/>
-              <a:t>1/2/22</a:t>
+              <a:t>1/4/22</a:t>
             </a:fld>
             <a:endParaRPr lang="en-US"/>
           </a:p>
@@ -3787,7 +3787,7 @@
         </p:nvSpPr>
         <p:spPr>
           <a:xfrm>
-            <a:off x="338702" y="1941234"/>
+            <a:off x="355882" y="2114546"/>
             <a:ext cx="1080813" cy="387927"/>
           </a:xfrm>
           <a:prstGeom prst="rect">
@@ -3965,7 +3965,7 @@
         </p:nvCxnSpPr>
         <p:spPr>
           <a:xfrm flipH="1">
-            <a:off x="2724202" y="75118"/>
+            <a:off x="3670114" y="74342"/>
             <a:ext cx="6542" cy="9385711"/>
           </a:xfrm>
           <a:prstGeom prst="line">
@@ -4008,7 +4008,7 @@
         </p:nvCxnSpPr>
         <p:spPr>
           <a:xfrm>
-            <a:off x="4713926" y="59352"/>
+            <a:off x="4713926" y="74342"/>
             <a:ext cx="0" cy="9401477"/>
           </a:xfrm>
           <a:prstGeom prst="line">
@@ -4049,7 +4049,7 @@
         </p:nvSpPr>
         <p:spPr>
           <a:xfrm>
-            <a:off x="360376" y="286404"/>
+            <a:off x="360376" y="304588"/>
             <a:ext cx="1037465" cy="369332"/>
           </a:xfrm>
           <a:prstGeom prst="rect">
@@ -4084,7 +4084,7 @@
         </p:nvSpPr>
         <p:spPr>
           <a:xfrm>
-            <a:off x="10567636" y="301976"/>
+            <a:off x="10567636" y="304588"/>
             <a:ext cx="1929374" cy="369332"/>
           </a:xfrm>
           <a:prstGeom prst="rect">
@@ -4162,7 +4162,7 @@
         </p:nvSpPr>
         <p:spPr>
           <a:xfrm>
-            <a:off x="4820434" y="147907"/>
+            <a:off x="4820434" y="166089"/>
             <a:ext cx="669414" cy="646331"/>
           </a:xfrm>
           <a:prstGeom prst="rect">
@@ -4204,7 +4204,7 @@
         </p:nvSpPr>
         <p:spPr>
           <a:xfrm>
-            <a:off x="4614735" y="1941234"/>
+            <a:off x="4631915" y="2114546"/>
             <a:ext cx="1080813" cy="387927"/>
           </a:xfrm>
           <a:prstGeom prst="rect">
@@ -4242,7 +4242,7 @@
         </p:nvCxnSpPr>
         <p:spPr>
           <a:xfrm>
-            <a:off x="5584748" y="59352"/>
+            <a:off x="5584748" y="74342"/>
             <a:ext cx="0" cy="9401477"/>
           </a:xfrm>
           <a:prstGeom prst="line">
@@ -4285,7 +4285,7 @@
         </p:nvCxnSpPr>
         <p:spPr>
           <a:xfrm>
-            <a:off x="6626008" y="111669"/>
+            <a:off x="6626008" y="74342"/>
             <a:ext cx="0" cy="9349160"/>
           </a:xfrm>
           <a:prstGeom prst="line">
@@ -4326,7 +4326,7 @@
         </p:nvSpPr>
         <p:spPr>
           <a:xfrm>
-            <a:off x="5678154" y="147907"/>
+            <a:off x="5678154" y="166089"/>
             <a:ext cx="869148" cy="646331"/>
           </a:xfrm>
           <a:prstGeom prst="rect">
@@ -4368,7 +4368,7 @@
         </p:nvSpPr>
         <p:spPr>
           <a:xfrm>
-            <a:off x="5714847" y="1941234"/>
+            <a:off x="5732027" y="2114546"/>
             <a:ext cx="795762" cy="387927"/>
           </a:xfrm>
           <a:prstGeom prst="rect">
@@ -4406,7 +4406,7 @@
         </p:nvCxnSpPr>
         <p:spPr>
           <a:xfrm>
-            <a:off x="1684954" y="85626"/>
+            <a:off x="1535054" y="74342"/>
             <a:ext cx="0" cy="9375203"/>
           </a:xfrm>
           <a:prstGeom prst="line">
@@ -5978,7 +5978,7 @@
         </p:nvSpPr>
         <p:spPr>
           <a:xfrm>
-            <a:off x="3303976" y="153458"/>
+            <a:off x="3798052" y="166089"/>
             <a:ext cx="881780" cy="646331"/>
           </a:xfrm>
           <a:prstGeom prst="rect">
@@ -6020,7 +6020,7 @@
         </p:nvSpPr>
         <p:spPr>
           <a:xfrm>
-            <a:off x="3112195" y="1951083"/>
+            <a:off x="3623451" y="2114546"/>
             <a:ext cx="1173078" cy="387927"/>
           </a:xfrm>
           <a:prstGeom prst="rect">
@@ -6056,7 +6056,7 @@
         </p:nvSpPr>
         <p:spPr>
           <a:xfrm>
-            <a:off x="8743554" y="5444776"/>
+            <a:off x="8743554" y="4650299"/>
             <a:ext cx="4979556" cy="502766"/>
           </a:xfrm>
           <a:prstGeom prst="rect">
@@ -6125,7 +6125,7 @@
         </p:nvCxnSpPr>
         <p:spPr>
           <a:xfrm>
-            <a:off x="7518142" y="5696159"/>
+            <a:off x="7518142" y="4901682"/>
             <a:ext cx="1293154" cy="0"/>
           </a:xfrm>
           <a:prstGeom prst="line">
@@ -6168,7 +6168,7 @@
         </p:nvCxnSpPr>
         <p:spPr>
           <a:xfrm>
-            <a:off x="13537920" y="5696159"/>
+            <a:off x="13537920" y="4901682"/>
             <a:ext cx="1325495" cy="0"/>
           </a:xfrm>
           <a:prstGeom prst="line">
@@ -6211,7 +6211,7 @@
         </p:nvCxnSpPr>
         <p:spPr>
           <a:xfrm>
-            <a:off x="7513097" y="6183446"/>
+            <a:off x="7513097" y="5388969"/>
             <a:ext cx="1293154" cy="0"/>
           </a:xfrm>
           <a:prstGeom prst="line">
@@ -6254,7 +6254,7 @@
         </p:nvCxnSpPr>
         <p:spPr>
           <a:xfrm>
-            <a:off x="13532875" y="6183446"/>
+            <a:off x="13532875" y="5388969"/>
             <a:ext cx="1325495" cy="0"/>
           </a:xfrm>
           <a:prstGeom prst="line">
@@ -6295,7 +6295,7 @@
         </p:nvSpPr>
         <p:spPr>
           <a:xfrm>
-            <a:off x="8743554" y="5928493"/>
+            <a:off x="8743554" y="5134016"/>
             <a:ext cx="4886963" cy="502766"/>
           </a:xfrm>
           <a:prstGeom prst="rect">
@@ -6362,7 +6362,7 @@
         </p:nvGrpSpPr>
         <p:grpSpPr>
           <a:xfrm>
-            <a:off x="8920925" y="5838367"/>
+            <a:off x="8920925" y="5043890"/>
             <a:ext cx="3865401" cy="179803"/>
             <a:chOff x="2537530" y="2602325"/>
             <a:chExt cx="3623813" cy="168565"/>
@@ -7243,7 +7243,7 @@
         </p:nvSpPr>
         <p:spPr>
           <a:xfrm>
-            <a:off x="14823446" y="5632764"/>
+            <a:off x="14823446" y="4838287"/>
             <a:ext cx="1080813" cy="615553"/>
           </a:xfrm>
           <a:prstGeom prst="rect">
@@ -7286,7 +7286,7 @@
         </p:nvSpPr>
         <p:spPr>
           <a:xfrm>
-            <a:off x="14636968" y="5408236"/>
+            <a:off x="14636968" y="4613759"/>
             <a:ext cx="1080813" cy="338554"/>
           </a:xfrm>
           <a:prstGeom prst="rect">
@@ -7321,7 +7321,7 @@
         </p:nvSpPr>
         <p:spPr>
           <a:xfrm>
-            <a:off x="14636968" y="6137519"/>
+            <a:off x="14636968" y="5343042"/>
             <a:ext cx="1080813" cy="338554"/>
           </a:xfrm>
           <a:prstGeom prst="rect">
@@ -7356,7 +7356,7 @@
         </p:nvSpPr>
         <p:spPr>
           <a:xfrm>
-            <a:off x="7465755" y="5408236"/>
+            <a:off x="7465755" y="4613759"/>
             <a:ext cx="368278" cy="338554"/>
           </a:xfrm>
           <a:prstGeom prst="rect">
@@ -7391,7 +7391,7 @@
         </p:nvSpPr>
         <p:spPr>
           <a:xfrm>
-            <a:off x="7465755" y="6137519"/>
+            <a:off x="7465755" y="5343042"/>
             <a:ext cx="435702" cy="338554"/>
           </a:xfrm>
           <a:prstGeom prst="rect">
@@ -7426,7 +7426,7 @@
         </p:nvSpPr>
         <p:spPr>
           <a:xfrm>
-            <a:off x="1785830" y="188764"/>
+            <a:off x="2808030" y="166089"/>
             <a:ext cx="835485" cy="646331"/>
           </a:xfrm>
           <a:prstGeom prst="rect">
@@ -7468,7 +7468,7 @@
         </p:nvSpPr>
         <p:spPr>
           <a:xfrm>
-            <a:off x="1677992" y="1941234"/>
+            <a:off x="2717372" y="2114546"/>
             <a:ext cx="1080813" cy="387927"/>
           </a:xfrm>
           <a:prstGeom prst="rect">
@@ -7506,8 +7506,8 @@
         </p:nvCxnSpPr>
         <p:spPr>
           <a:xfrm flipH="1">
-            <a:off x="11158790" y="4307942"/>
-            <a:ext cx="1" cy="846666"/>
+            <a:off x="11158789" y="4113072"/>
+            <a:ext cx="3" cy="341058"/>
           </a:xfrm>
           <a:prstGeom prst="straightConnector1">
             <a:avLst/>
@@ -7534,6 +7534,127 @@
           </a:fontRef>
         </p:style>
       </p:cxnSp>
+      <p:cxnSp>
+        <p:nvCxnSpPr>
+          <p:cNvPr id="107" name="Straight Connector 106">
+            <a:extLst>
+              <a:ext uri="{FF2B5EF4-FFF2-40B4-BE49-F238E27FC236}">
+                <a16:creationId xmlns:a16="http://schemas.microsoft.com/office/drawing/2014/main" id="{776B2958-3E90-0B4E-BA29-D8BF3D0F1DB0}"/>
+              </a:ext>
+            </a:extLst>
+          </p:cNvPr>
+          <p:cNvCxnSpPr>
+            <a:cxnSpLocks/>
+          </p:cNvCxnSpPr>
+          <p:nvPr/>
+        </p:nvCxnSpPr>
+        <p:spPr>
+          <a:xfrm>
+            <a:off x="2758805" y="74342"/>
+            <a:ext cx="0" cy="9375203"/>
+          </a:xfrm>
+          <a:prstGeom prst="line">
+            <a:avLst/>
+          </a:prstGeom>
+          <a:ln>
+            <a:solidFill>
+              <a:schemeClr val="tx1"/>
+            </a:solidFill>
+          </a:ln>
+        </p:spPr>
+        <p:style>
+          <a:lnRef idx="1">
+            <a:schemeClr val="accent1"/>
+          </a:lnRef>
+          <a:fillRef idx="0">
+            <a:schemeClr val="accent1"/>
+          </a:fillRef>
+          <a:effectRef idx="0">
+            <a:schemeClr val="accent1"/>
+          </a:effectRef>
+          <a:fontRef idx="minor">
+            <a:schemeClr val="tx1"/>
+          </a:fontRef>
+        </p:style>
+      </p:cxnSp>
+      <p:sp>
+        <p:nvSpPr>
+          <p:cNvPr id="108" name="Rectangle 107">
+            <a:extLst>
+              <a:ext uri="{FF2B5EF4-FFF2-40B4-BE49-F238E27FC236}">
+                <a16:creationId xmlns:a16="http://schemas.microsoft.com/office/drawing/2014/main" id="{FD47C632-B055-7244-A0BE-762767E8EC85}"/>
+              </a:ext>
+            </a:extLst>
+          </p:cNvPr>
+          <p:cNvSpPr/>
+          <p:nvPr/>
+        </p:nvSpPr>
+        <p:spPr>
+          <a:xfrm>
+            <a:off x="1498194" y="166089"/>
+            <a:ext cx="1336584" cy="646331"/>
+          </a:xfrm>
+          <a:prstGeom prst="rect">
+            <a:avLst/>
+          </a:prstGeom>
+        </p:spPr>
+        <p:txBody>
+          <a:bodyPr wrap="none">
+            <a:spAutoFit/>
+          </a:bodyPr>
+          <a:lstStyle/>
+          <a:p>
+            <a:pPr algn="ctr"/>
+            <a:r>
+              <a:rPr lang="en-US" dirty="0"/>
+              <a:t>Base</a:t>
+            </a:r>
+          </a:p>
+          <a:p>
+            <a:pPr algn="ctr"/>
+            <a:r>
+              <a:rPr lang="en-US" dirty="0"/>
+              <a:t>editor name</a:t>
+            </a:r>
+          </a:p>
+        </p:txBody>
+      </p:sp>
+      <p:sp>
+        <p:nvSpPr>
+          <p:cNvPr id="110" name="TextBox 109">
+            <a:extLst>
+              <a:ext uri="{FF2B5EF4-FFF2-40B4-BE49-F238E27FC236}">
+                <a16:creationId xmlns:a16="http://schemas.microsoft.com/office/drawing/2014/main" id="{DF8A5565-90AC-9340-B3C6-21853229466B}"/>
+              </a:ext>
+            </a:extLst>
+          </p:cNvPr>
+          <p:cNvSpPr txBox="1"/>
+          <p:nvPr/>
+        </p:nvSpPr>
+        <p:spPr>
+          <a:xfrm>
+            <a:off x="1557271" y="2114546"/>
+            <a:ext cx="1080813" cy="387927"/>
+          </a:xfrm>
+          <a:prstGeom prst="rect">
+            <a:avLst/>
+          </a:prstGeom>
+          <a:noFill/>
+        </p:spPr>
+        <p:txBody>
+          <a:bodyPr wrap="square" rtlCol="0">
+            <a:spAutoFit/>
+          </a:bodyPr>
+          <a:lstStyle/>
+          <a:p>
+            <a:pPr algn="ctr"/>
+            <a:r>
+              <a:rPr lang="en-US" sz="1921" dirty="0"/>
+              <a:t>BE4max</a:t>
+            </a:r>
+          </a:p>
+        </p:txBody>
+      </p:sp>
     </p:spTree>
     <p:extLst>
       <p:ext uri="{BB962C8B-B14F-4D97-AF65-F5344CB8AC3E}">

</xml_diff>

<commit_message>
Added cartoon to vignette for BE
</commit_message>
<xml_diff>
--- a/vignettes/figures/nucleasesBaseEditor.pptx
+++ b/vignettes/figures/nucleasesBaseEditor.pptx
@@ -2,7 +2,7 @@
 <file path=ppt/presentation.xml><?xml version="1.0" encoding="utf-8"?>
 <p:presentation xmlns:a="http://schemas.openxmlformats.org/drawingml/2006/main" xmlns:r="http://schemas.openxmlformats.org/officeDocument/2006/relationships" xmlns:p="http://schemas.openxmlformats.org/presentationml/2006/main" saveSubsetFonts="1" autoCompressPictures="0">
   <p:sldMasterIdLst>
-    <p:sldMasterId id="2147483816" r:id="rId1"/>
+    <p:sldMasterId id="2147483888" r:id="rId1"/>
   </p:sldMasterIdLst>
   <p:notesMasterIdLst>
     <p:notesMasterId r:id="rId3"/>
@@ -10,7 +10,7 @@
   <p:sldIdLst>
     <p:sldId id="257" r:id="rId2"/>
   </p:sldIdLst>
-  <p:sldSz cx="16459200" cy="9601200"/>
+  <p:sldSz cx="15544800" cy="5761038"/>
   <p:notesSz cx="6858000" cy="9144000"/>
   <p:defaultTextStyle>
     <a:defPPr>
@@ -215,8 +215,8 @@
         </p:nvSpPr>
         <p:spPr>
           <a:xfrm>
-            <a:off x="784225" y="1143000"/>
-            <a:ext cx="5289550" cy="3086100"/>
+            <a:off x="-735013" y="1143000"/>
+            <a:ext cx="8328026" cy="3086100"/>
           </a:xfrm>
           <a:prstGeom prst="rect">
             <a:avLst/>
@@ -370,8 +370,8 @@
   </p:cSld>
   <p:clrMap bg1="lt1" tx1="dk1" bg2="lt2" tx2="dk2" accent1="accent1" accent2="accent2" accent3="accent3" accent4="accent4" accent5="accent5" accent6="accent6" hlink="hlink" folHlink="folHlink"/>
   <p:notesStyle>
-    <a:lvl1pPr marL="0" algn="l" defTabSz="914400" rtl="0" eaLnBrk="1" latinLnBrk="0" hangingPunct="1">
-      <a:defRPr sz="1200" kern="1200">
+    <a:lvl1pPr marL="0" algn="l" defTabSz="895198" rtl="0" eaLnBrk="1" latinLnBrk="0" hangingPunct="1">
+      <a:defRPr sz="1175" kern="1200">
         <a:solidFill>
           <a:schemeClr val="tx1"/>
         </a:solidFill>
@@ -380,8 +380,8 @@
         <a:cs typeface="+mn-cs"/>
       </a:defRPr>
     </a:lvl1pPr>
-    <a:lvl2pPr marL="457200" algn="l" defTabSz="914400" rtl="0" eaLnBrk="1" latinLnBrk="0" hangingPunct="1">
-      <a:defRPr sz="1200" kern="1200">
+    <a:lvl2pPr marL="447599" algn="l" defTabSz="895198" rtl="0" eaLnBrk="1" latinLnBrk="0" hangingPunct="1">
+      <a:defRPr sz="1175" kern="1200">
         <a:solidFill>
           <a:schemeClr val="tx1"/>
         </a:solidFill>
@@ -390,8 +390,8 @@
         <a:cs typeface="+mn-cs"/>
       </a:defRPr>
     </a:lvl2pPr>
-    <a:lvl3pPr marL="914400" algn="l" defTabSz="914400" rtl="0" eaLnBrk="1" latinLnBrk="0" hangingPunct="1">
-      <a:defRPr sz="1200" kern="1200">
+    <a:lvl3pPr marL="895198" algn="l" defTabSz="895198" rtl="0" eaLnBrk="1" latinLnBrk="0" hangingPunct="1">
+      <a:defRPr sz="1175" kern="1200">
         <a:solidFill>
           <a:schemeClr val="tx1"/>
         </a:solidFill>
@@ -400,8 +400,8 @@
         <a:cs typeface="+mn-cs"/>
       </a:defRPr>
     </a:lvl3pPr>
-    <a:lvl4pPr marL="1371600" algn="l" defTabSz="914400" rtl="0" eaLnBrk="1" latinLnBrk="0" hangingPunct="1">
-      <a:defRPr sz="1200" kern="1200">
+    <a:lvl4pPr marL="1342796" algn="l" defTabSz="895198" rtl="0" eaLnBrk="1" latinLnBrk="0" hangingPunct="1">
+      <a:defRPr sz="1175" kern="1200">
         <a:solidFill>
           <a:schemeClr val="tx1"/>
         </a:solidFill>
@@ -410,8 +410,8 @@
         <a:cs typeface="+mn-cs"/>
       </a:defRPr>
     </a:lvl4pPr>
-    <a:lvl5pPr marL="1828800" algn="l" defTabSz="914400" rtl="0" eaLnBrk="1" latinLnBrk="0" hangingPunct="1">
-      <a:defRPr sz="1200" kern="1200">
+    <a:lvl5pPr marL="1790395" algn="l" defTabSz="895198" rtl="0" eaLnBrk="1" latinLnBrk="0" hangingPunct="1">
+      <a:defRPr sz="1175" kern="1200">
         <a:solidFill>
           <a:schemeClr val="tx1"/>
         </a:solidFill>
@@ -420,8 +420,8 @@
         <a:cs typeface="+mn-cs"/>
       </a:defRPr>
     </a:lvl5pPr>
-    <a:lvl6pPr marL="2286000" algn="l" defTabSz="914400" rtl="0" eaLnBrk="1" latinLnBrk="0" hangingPunct="1">
-      <a:defRPr sz="1200" kern="1200">
+    <a:lvl6pPr marL="2237994" algn="l" defTabSz="895198" rtl="0" eaLnBrk="1" latinLnBrk="0" hangingPunct="1">
+      <a:defRPr sz="1175" kern="1200">
         <a:solidFill>
           <a:schemeClr val="tx1"/>
         </a:solidFill>
@@ -430,8 +430,8 @@
         <a:cs typeface="+mn-cs"/>
       </a:defRPr>
     </a:lvl6pPr>
-    <a:lvl7pPr marL="2743200" algn="l" defTabSz="914400" rtl="0" eaLnBrk="1" latinLnBrk="0" hangingPunct="1">
-      <a:defRPr sz="1200" kern="1200">
+    <a:lvl7pPr marL="2685593" algn="l" defTabSz="895198" rtl="0" eaLnBrk="1" latinLnBrk="0" hangingPunct="1">
+      <a:defRPr sz="1175" kern="1200">
         <a:solidFill>
           <a:schemeClr val="tx1"/>
         </a:solidFill>
@@ -440,8 +440,8 @@
         <a:cs typeface="+mn-cs"/>
       </a:defRPr>
     </a:lvl7pPr>
-    <a:lvl8pPr marL="3200400" algn="l" defTabSz="914400" rtl="0" eaLnBrk="1" latinLnBrk="0" hangingPunct="1">
-      <a:defRPr sz="1200" kern="1200">
+    <a:lvl8pPr marL="3133192" algn="l" defTabSz="895198" rtl="0" eaLnBrk="1" latinLnBrk="0" hangingPunct="1">
+      <a:defRPr sz="1175" kern="1200">
         <a:solidFill>
           <a:schemeClr val="tx1"/>
         </a:solidFill>
@@ -450,8 +450,8 @@
         <a:cs typeface="+mn-cs"/>
       </a:defRPr>
     </a:lvl8pPr>
-    <a:lvl9pPr marL="3657600" algn="l" defTabSz="914400" rtl="0" eaLnBrk="1" latinLnBrk="0" hangingPunct="1">
-      <a:defRPr sz="1200" kern="1200">
+    <a:lvl9pPr marL="3580790" algn="l" defTabSz="895198" rtl="0" eaLnBrk="1" latinLnBrk="0" hangingPunct="1">
+      <a:defRPr sz="1175" kern="1200">
         <a:solidFill>
           <a:schemeClr val="tx1"/>
         </a:solidFill>
@@ -493,8 +493,8 @@
         </p:nvSpPr>
         <p:spPr>
           <a:xfrm>
-            <a:off x="784225" y="1143000"/>
-            <a:ext cx="5289550" cy="3086100"/>
+            <a:off x="-735013" y="1143000"/>
+            <a:ext cx="8328026" cy="3086100"/>
           </a:xfrm>
         </p:spPr>
       </p:sp>
@@ -582,15 +582,15 @@
         </p:nvSpPr>
         <p:spPr>
           <a:xfrm>
-            <a:off x="2057400" y="1571308"/>
-            <a:ext cx="12344400" cy="3342640"/>
+            <a:off x="1943100" y="942837"/>
+            <a:ext cx="11658600" cy="2005695"/>
           </a:xfrm>
         </p:spPr>
         <p:txBody>
           <a:bodyPr anchor="b"/>
           <a:lstStyle>
             <a:lvl1pPr algn="ctr">
-              <a:defRPr sz="8100"/>
+              <a:defRPr sz="5040"/>
             </a:lvl1pPr>
           </a:lstStyle>
           <a:p>
@@ -614,8 +614,8 @@
         </p:nvSpPr>
         <p:spPr>
           <a:xfrm>
-            <a:off x="2057400" y="5042853"/>
-            <a:ext cx="12344400" cy="2318067"/>
+            <a:off x="1943100" y="3025879"/>
+            <a:ext cx="11658600" cy="1390917"/>
           </a:xfrm>
         </p:spPr>
         <p:txBody>
@@ -623,39 +623,39 @@
           <a:lstStyle>
             <a:lvl1pPr marL="0" indent="0" algn="ctr">
               <a:buNone/>
-              <a:defRPr sz="3240"/>
+              <a:defRPr sz="2016"/>
             </a:lvl1pPr>
-            <a:lvl2pPr marL="617220" indent="0" algn="ctr">
+            <a:lvl2pPr marL="384048" indent="0" algn="ctr">
               <a:buNone/>
-              <a:defRPr sz="2700"/>
+              <a:defRPr sz="1680"/>
             </a:lvl2pPr>
-            <a:lvl3pPr marL="1234440" indent="0" algn="ctr">
+            <a:lvl3pPr marL="768096" indent="0" algn="ctr">
               <a:buNone/>
-              <a:defRPr sz="2430"/>
+              <a:defRPr sz="1512"/>
             </a:lvl3pPr>
-            <a:lvl4pPr marL="1851660" indent="0" algn="ctr">
+            <a:lvl4pPr marL="1152144" indent="0" algn="ctr">
               <a:buNone/>
-              <a:defRPr sz="2160"/>
+              <a:defRPr sz="1344"/>
             </a:lvl4pPr>
-            <a:lvl5pPr marL="2468880" indent="0" algn="ctr">
+            <a:lvl5pPr marL="1536192" indent="0" algn="ctr">
               <a:buNone/>
-              <a:defRPr sz="2160"/>
+              <a:defRPr sz="1344"/>
             </a:lvl5pPr>
-            <a:lvl6pPr marL="3086100" indent="0" algn="ctr">
+            <a:lvl6pPr marL="1920240" indent="0" algn="ctr">
               <a:buNone/>
-              <a:defRPr sz="2160"/>
+              <a:defRPr sz="1344"/>
             </a:lvl6pPr>
-            <a:lvl7pPr marL="3703320" indent="0" algn="ctr">
+            <a:lvl7pPr marL="2304288" indent="0" algn="ctr">
               <a:buNone/>
-              <a:defRPr sz="2160"/>
+              <a:defRPr sz="1344"/>
             </a:lvl7pPr>
-            <a:lvl8pPr marL="4320540" indent="0" algn="ctr">
+            <a:lvl8pPr marL="2688336" indent="0" algn="ctr">
               <a:buNone/>
-              <a:defRPr sz="2160"/>
+              <a:defRPr sz="1344"/>
             </a:lvl8pPr>
-            <a:lvl9pPr marL="4937760" indent="0" algn="ctr">
+            <a:lvl9pPr marL="3072384" indent="0" algn="ctr">
               <a:buNone/>
-              <a:defRPr sz="2160"/>
+              <a:defRPr sz="1344"/>
             </a:lvl9pPr>
           </a:lstStyle>
           <a:p>
@@ -735,7 +735,7 @@
     </p:spTree>
     <p:extLst>
       <p:ext uri="{BB962C8B-B14F-4D97-AF65-F5344CB8AC3E}">
-        <p14:creationId xmlns:p14="http://schemas.microsoft.com/office/powerpoint/2010/main" val="1527012138"/>
+        <p14:creationId xmlns:p14="http://schemas.microsoft.com/office/powerpoint/2010/main" val="273904008"/>
       </p:ext>
     </p:extLst>
   </p:cSld>
@@ -905,7 +905,7 @@
     </p:spTree>
     <p:extLst>
       <p:ext uri="{BB962C8B-B14F-4D97-AF65-F5344CB8AC3E}">
-        <p14:creationId xmlns:p14="http://schemas.microsoft.com/office/powerpoint/2010/main" val="2991324013"/>
+        <p14:creationId xmlns:p14="http://schemas.microsoft.com/office/powerpoint/2010/main" val="4236558563"/>
       </p:ext>
     </p:extLst>
   </p:cSld>
@@ -944,8 +944,8 @@
         </p:nvSpPr>
         <p:spPr>
           <a:xfrm>
-            <a:off x="11778615" y="511175"/>
-            <a:ext cx="3549015" cy="8136573"/>
+            <a:off x="11124247" y="306722"/>
+            <a:ext cx="3351848" cy="4882213"/>
           </a:xfrm>
         </p:spPr>
         <p:txBody>
@@ -972,8 +972,8 @@
         </p:nvSpPr>
         <p:spPr>
           <a:xfrm>
-            <a:off x="1131570" y="511175"/>
-            <a:ext cx="10441305" cy="8136573"/>
+            <a:off x="1068705" y="306722"/>
+            <a:ext cx="9861233" cy="4882213"/>
           </a:xfrm>
         </p:spPr>
         <p:txBody>
@@ -1085,7 +1085,7 @@
     </p:spTree>
     <p:extLst>
       <p:ext uri="{BB962C8B-B14F-4D97-AF65-F5344CB8AC3E}">
-        <p14:creationId xmlns:p14="http://schemas.microsoft.com/office/powerpoint/2010/main" val="895468503"/>
+        <p14:creationId xmlns:p14="http://schemas.microsoft.com/office/powerpoint/2010/main" val="2654094694"/>
       </p:ext>
     </p:extLst>
   </p:cSld>
@@ -1255,7 +1255,7 @@
     </p:spTree>
     <p:extLst>
       <p:ext uri="{BB962C8B-B14F-4D97-AF65-F5344CB8AC3E}">
-        <p14:creationId xmlns:p14="http://schemas.microsoft.com/office/powerpoint/2010/main" val="3675647075"/>
+        <p14:creationId xmlns:p14="http://schemas.microsoft.com/office/powerpoint/2010/main" val="1517054093"/>
       </p:ext>
     </p:extLst>
   </p:cSld>
@@ -1294,15 +1294,15 @@
         </p:nvSpPr>
         <p:spPr>
           <a:xfrm>
-            <a:off x="1122998" y="2393634"/>
-            <a:ext cx="14196060" cy="3993832"/>
+            <a:off x="1060609" y="1436260"/>
+            <a:ext cx="13407390" cy="2396431"/>
           </a:xfrm>
         </p:spPr>
         <p:txBody>
           <a:bodyPr anchor="b"/>
           <a:lstStyle>
             <a:lvl1pPr>
-              <a:defRPr sz="8100"/>
+              <a:defRPr sz="5040"/>
             </a:lvl1pPr>
           </a:lstStyle>
           <a:p>
@@ -1326,8 +1326,8 @@
         </p:nvSpPr>
         <p:spPr>
           <a:xfrm>
-            <a:off x="1122998" y="6425249"/>
-            <a:ext cx="14196060" cy="2100262"/>
+            <a:off x="1060609" y="3855362"/>
+            <a:ext cx="13407390" cy="1260227"/>
           </a:xfrm>
         </p:spPr>
         <p:txBody>
@@ -1335,7 +1335,7 @@
           <a:lstStyle>
             <a:lvl1pPr marL="0" indent="0">
               <a:buNone/>
-              <a:defRPr sz="3240">
+              <a:defRPr sz="2016">
                 <a:solidFill>
                   <a:schemeClr val="tx1">
                     <a:tint val="75000"/>
@@ -1343,9 +1343,9 @@
                 </a:solidFill>
               </a:defRPr>
             </a:lvl1pPr>
-            <a:lvl2pPr marL="617220" indent="0">
+            <a:lvl2pPr marL="384048" indent="0">
               <a:buNone/>
-              <a:defRPr sz="2700">
+              <a:defRPr sz="1680">
                 <a:solidFill>
                   <a:schemeClr val="tx1">
                     <a:tint val="75000"/>
@@ -1353,9 +1353,9 @@
                 </a:solidFill>
               </a:defRPr>
             </a:lvl2pPr>
-            <a:lvl3pPr marL="1234440" indent="0">
+            <a:lvl3pPr marL="768096" indent="0">
               <a:buNone/>
-              <a:defRPr sz="2430">
+              <a:defRPr sz="1512">
                 <a:solidFill>
                   <a:schemeClr val="tx1">
                     <a:tint val="75000"/>
@@ -1363,9 +1363,9 @@
                 </a:solidFill>
               </a:defRPr>
             </a:lvl3pPr>
-            <a:lvl4pPr marL="1851660" indent="0">
+            <a:lvl4pPr marL="1152144" indent="0">
               <a:buNone/>
-              <a:defRPr sz="2160">
+              <a:defRPr sz="1344">
                 <a:solidFill>
                   <a:schemeClr val="tx1">
                     <a:tint val="75000"/>
@@ -1373,9 +1373,9 @@
                 </a:solidFill>
               </a:defRPr>
             </a:lvl4pPr>
-            <a:lvl5pPr marL="2468880" indent="0">
+            <a:lvl5pPr marL="1536192" indent="0">
               <a:buNone/>
-              <a:defRPr sz="2160">
+              <a:defRPr sz="1344">
                 <a:solidFill>
                   <a:schemeClr val="tx1">
                     <a:tint val="75000"/>
@@ -1383,9 +1383,9 @@
                 </a:solidFill>
               </a:defRPr>
             </a:lvl5pPr>
-            <a:lvl6pPr marL="3086100" indent="0">
+            <a:lvl6pPr marL="1920240" indent="0">
               <a:buNone/>
-              <a:defRPr sz="2160">
+              <a:defRPr sz="1344">
                 <a:solidFill>
                   <a:schemeClr val="tx1">
                     <a:tint val="75000"/>
@@ -1393,9 +1393,9 @@
                 </a:solidFill>
               </a:defRPr>
             </a:lvl6pPr>
-            <a:lvl7pPr marL="3703320" indent="0">
+            <a:lvl7pPr marL="2304288" indent="0">
               <a:buNone/>
-              <a:defRPr sz="2160">
+              <a:defRPr sz="1344">
                 <a:solidFill>
                   <a:schemeClr val="tx1">
                     <a:tint val="75000"/>
@@ -1403,9 +1403,9 @@
                 </a:solidFill>
               </a:defRPr>
             </a:lvl7pPr>
-            <a:lvl8pPr marL="4320540" indent="0">
+            <a:lvl8pPr marL="2688336" indent="0">
               <a:buNone/>
-              <a:defRPr sz="2160">
+              <a:defRPr sz="1344">
                 <a:solidFill>
                   <a:schemeClr val="tx1">
                     <a:tint val="75000"/>
@@ -1413,9 +1413,9 @@
                 </a:solidFill>
               </a:defRPr>
             </a:lvl8pPr>
-            <a:lvl9pPr marL="4937760" indent="0">
+            <a:lvl9pPr marL="3072384" indent="0">
               <a:buNone/>
-              <a:defRPr sz="2160">
+              <a:defRPr sz="1344">
                 <a:solidFill>
                   <a:schemeClr val="tx1">
                     <a:tint val="75000"/>
@@ -1501,7 +1501,7 @@
     </p:spTree>
     <p:extLst>
       <p:ext uri="{BB962C8B-B14F-4D97-AF65-F5344CB8AC3E}">
-        <p14:creationId xmlns:p14="http://schemas.microsoft.com/office/powerpoint/2010/main" val="928641052"/>
+        <p14:creationId xmlns:p14="http://schemas.microsoft.com/office/powerpoint/2010/main" val="1123789886"/>
       </p:ext>
     </p:extLst>
   </p:cSld>
@@ -1563,8 +1563,8 @@
         </p:nvSpPr>
         <p:spPr>
           <a:xfrm>
-            <a:off x="1131570" y="2555875"/>
-            <a:ext cx="6995160" cy="6091873"/>
+            <a:off x="1068705" y="1533609"/>
+            <a:ext cx="6606540" cy="3655326"/>
           </a:xfrm>
         </p:spPr>
         <p:txBody>
@@ -1620,8 +1620,8 @@
         </p:nvSpPr>
         <p:spPr>
           <a:xfrm>
-            <a:off x="8332470" y="2555875"/>
-            <a:ext cx="6995160" cy="6091873"/>
+            <a:off x="7869555" y="1533609"/>
+            <a:ext cx="6606540" cy="3655326"/>
           </a:xfrm>
         </p:spPr>
         <p:txBody>
@@ -1733,7 +1733,7 @@
     </p:spTree>
     <p:extLst>
       <p:ext uri="{BB962C8B-B14F-4D97-AF65-F5344CB8AC3E}">
-        <p14:creationId xmlns:p14="http://schemas.microsoft.com/office/powerpoint/2010/main" val="165828989"/>
+        <p14:creationId xmlns:p14="http://schemas.microsoft.com/office/powerpoint/2010/main" val="2298190330"/>
       </p:ext>
     </p:extLst>
   </p:cSld>
@@ -1772,8 +1772,8 @@
         </p:nvSpPr>
         <p:spPr>
           <a:xfrm>
-            <a:off x="1133714" y="511176"/>
-            <a:ext cx="14196060" cy="1855788"/>
+            <a:off x="1070730" y="306723"/>
+            <a:ext cx="13407390" cy="1113534"/>
           </a:xfrm>
         </p:spPr>
         <p:txBody>
@@ -1800,8 +1800,8 @@
         </p:nvSpPr>
         <p:spPr>
           <a:xfrm>
-            <a:off x="1133715" y="2353628"/>
-            <a:ext cx="6963012" cy="1153477"/>
+            <a:off x="1070731" y="1412255"/>
+            <a:ext cx="6576178" cy="692124"/>
           </a:xfrm>
         </p:spPr>
         <p:txBody>
@@ -1809,39 +1809,39 @@
           <a:lstStyle>
             <a:lvl1pPr marL="0" indent="0">
               <a:buNone/>
-              <a:defRPr sz="3240" b="1"/>
+              <a:defRPr sz="2016" b="1"/>
             </a:lvl1pPr>
-            <a:lvl2pPr marL="617220" indent="0">
+            <a:lvl2pPr marL="384048" indent="0">
               <a:buNone/>
-              <a:defRPr sz="2700" b="1"/>
+              <a:defRPr sz="1680" b="1"/>
             </a:lvl2pPr>
-            <a:lvl3pPr marL="1234440" indent="0">
+            <a:lvl3pPr marL="768096" indent="0">
               <a:buNone/>
-              <a:defRPr sz="2430" b="1"/>
+              <a:defRPr sz="1512" b="1"/>
             </a:lvl3pPr>
-            <a:lvl4pPr marL="1851660" indent="0">
+            <a:lvl4pPr marL="1152144" indent="0">
               <a:buNone/>
-              <a:defRPr sz="2160" b="1"/>
+              <a:defRPr sz="1344" b="1"/>
             </a:lvl4pPr>
-            <a:lvl5pPr marL="2468880" indent="0">
+            <a:lvl5pPr marL="1536192" indent="0">
               <a:buNone/>
-              <a:defRPr sz="2160" b="1"/>
+              <a:defRPr sz="1344" b="1"/>
             </a:lvl5pPr>
-            <a:lvl6pPr marL="3086100" indent="0">
+            <a:lvl6pPr marL="1920240" indent="0">
               <a:buNone/>
-              <a:defRPr sz="2160" b="1"/>
+              <a:defRPr sz="1344" b="1"/>
             </a:lvl6pPr>
-            <a:lvl7pPr marL="3703320" indent="0">
+            <a:lvl7pPr marL="2304288" indent="0">
               <a:buNone/>
-              <a:defRPr sz="2160" b="1"/>
+              <a:defRPr sz="1344" b="1"/>
             </a:lvl7pPr>
-            <a:lvl8pPr marL="4320540" indent="0">
+            <a:lvl8pPr marL="2688336" indent="0">
               <a:buNone/>
-              <a:defRPr sz="2160" b="1"/>
+              <a:defRPr sz="1344" b="1"/>
             </a:lvl8pPr>
-            <a:lvl9pPr marL="4937760" indent="0">
+            <a:lvl9pPr marL="3072384" indent="0">
               <a:buNone/>
-              <a:defRPr sz="2160" b="1"/>
+              <a:defRPr sz="1344" b="1"/>
             </a:lvl9pPr>
           </a:lstStyle>
           <a:p>
@@ -1865,8 +1865,8 @@
         </p:nvSpPr>
         <p:spPr>
           <a:xfrm>
-            <a:off x="1133715" y="3507105"/>
-            <a:ext cx="6963012" cy="5158423"/>
+            <a:off x="1070731" y="2104379"/>
+            <a:ext cx="6576178" cy="3095225"/>
           </a:xfrm>
         </p:spPr>
         <p:txBody>
@@ -1922,8 +1922,8 @@
         </p:nvSpPr>
         <p:spPr>
           <a:xfrm>
-            <a:off x="8332470" y="2353628"/>
-            <a:ext cx="6997304" cy="1153477"/>
+            <a:off x="7869555" y="1412255"/>
+            <a:ext cx="6608565" cy="692124"/>
           </a:xfrm>
         </p:spPr>
         <p:txBody>
@@ -1931,39 +1931,39 @@
           <a:lstStyle>
             <a:lvl1pPr marL="0" indent="0">
               <a:buNone/>
-              <a:defRPr sz="3240" b="1"/>
+              <a:defRPr sz="2016" b="1"/>
             </a:lvl1pPr>
-            <a:lvl2pPr marL="617220" indent="0">
+            <a:lvl2pPr marL="384048" indent="0">
               <a:buNone/>
-              <a:defRPr sz="2700" b="1"/>
+              <a:defRPr sz="1680" b="1"/>
             </a:lvl2pPr>
-            <a:lvl3pPr marL="1234440" indent="0">
+            <a:lvl3pPr marL="768096" indent="0">
               <a:buNone/>
-              <a:defRPr sz="2430" b="1"/>
+              <a:defRPr sz="1512" b="1"/>
             </a:lvl3pPr>
-            <a:lvl4pPr marL="1851660" indent="0">
+            <a:lvl4pPr marL="1152144" indent="0">
               <a:buNone/>
-              <a:defRPr sz="2160" b="1"/>
+              <a:defRPr sz="1344" b="1"/>
             </a:lvl4pPr>
-            <a:lvl5pPr marL="2468880" indent="0">
+            <a:lvl5pPr marL="1536192" indent="0">
               <a:buNone/>
-              <a:defRPr sz="2160" b="1"/>
+              <a:defRPr sz="1344" b="1"/>
             </a:lvl5pPr>
-            <a:lvl6pPr marL="3086100" indent="0">
+            <a:lvl6pPr marL="1920240" indent="0">
               <a:buNone/>
-              <a:defRPr sz="2160" b="1"/>
+              <a:defRPr sz="1344" b="1"/>
             </a:lvl6pPr>
-            <a:lvl7pPr marL="3703320" indent="0">
+            <a:lvl7pPr marL="2304288" indent="0">
               <a:buNone/>
-              <a:defRPr sz="2160" b="1"/>
+              <a:defRPr sz="1344" b="1"/>
             </a:lvl7pPr>
-            <a:lvl8pPr marL="4320540" indent="0">
+            <a:lvl8pPr marL="2688336" indent="0">
               <a:buNone/>
-              <a:defRPr sz="2160" b="1"/>
+              <a:defRPr sz="1344" b="1"/>
             </a:lvl8pPr>
-            <a:lvl9pPr marL="4937760" indent="0">
+            <a:lvl9pPr marL="3072384" indent="0">
               <a:buNone/>
-              <a:defRPr sz="2160" b="1"/>
+              <a:defRPr sz="1344" b="1"/>
             </a:lvl9pPr>
           </a:lstStyle>
           <a:p>
@@ -1987,8 +1987,8 @@
         </p:nvSpPr>
         <p:spPr>
           <a:xfrm>
-            <a:off x="8332470" y="3507105"/>
-            <a:ext cx="6997304" cy="5158423"/>
+            <a:off x="7869555" y="2104379"/>
+            <a:ext cx="6608565" cy="3095225"/>
           </a:xfrm>
         </p:spPr>
         <p:txBody>
@@ -2100,7 +2100,7 @@
     </p:spTree>
     <p:extLst>
       <p:ext uri="{BB962C8B-B14F-4D97-AF65-F5344CB8AC3E}">
-        <p14:creationId xmlns:p14="http://schemas.microsoft.com/office/powerpoint/2010/main" val="999058608"/>
+        <p14:creationId xmlns:p14="http://schemas.microsoft.com/office/powerpoint/2010/main" val="366189888"/>
       </p:ext>
     </p:extLst>
   </p:cSld>
@@ -2218,7 +2218,7 @@
     </p:spTree>
     <p:extLst>
       <p:ext uri="{BB962C8B-B14F-4D97-AF65-F5344CB8AC3E}">
-        <p14:creationId xmlns:p14="http://schemas.microsoft.com/office/powerpoint/2010/main" val="2115408804"/>
+        <p14:creationId xmlns:p14="http://schemas.microsoft.com/office/powerpoint/2010/main" val="4127676222"/>
       </p:ext>
     </p:extLst>
   </p:cSld>
@@ -2313,7 +2313,7 @@
     </p:spTree>
     <p:extLst>
       <p:ext uri="{BB962C8B-B14F-4D97-AF65-F5344CB8AC3E}">
-        <p14:creationId xmlns:p14="http://schemas.microsoft.com/office/powerpoint/2010/main" val="2609107253"/>
+        <p14:creationId xmlns:p14="http://schemas.microsoft.com/office/powerpoint/2010/main" val="4115965701"/>
       </p:ext>
     </p:extLst>
   </p:cSld>
@@ -2352,15 +2352,15 @@
         </p:nvSpPr>
         <p:spPr>
           <a:xfrm>
-            <a:off x="1133714" y="640080"/>
-            <a:ext cx="5308520" cy="2240280"/>
+            <a:off x="1070730" y="384069"/>
+            <a:ext cx="5013602" cy="1344242"/>
           </a:xfrm>
         </p:spPr>
         <p:txBody>
           <a:bodyPr anchor="b"/>
           <a:lstStyle>
             <a:lvl1pPr>
-              <a:defRPr sz="4320"/>
+              <a:defRPr sz="2688"/>
             </a:lvl1pPr>
           </a:lstStyle>
           <a:p>
@@ -2384,39 +2384,39 @@
         </p:nvSpPr>
         <p:spPr>
           <a:xfrm>
-            <a:off x="6997304" y="1382396"/>
-            <a:ext cx="8332470" cy="6823075"/>
+            <a:off x="6608565" y="829483"/>
+            <a:ext cx="7869555" cy="4094071"/>
           </a:xfrm>
         </p:spPr>
         <p:txBody>
           <a:bodyPr/>
           <a:lstStyle>
             <a:lvl1pPr>
-              <a:defRPr sz="4320"/>
+              <a:defRPr sz="2688"/>
             </a:lvl1pPr>
             <a:lvl2pPr>
-              <a:defRPr sz="3780"/>
+              <a:defRPr sz="2352"/>
             </a:lvl2pPr>
             <a:lvl3pPr>
-              <a:defRPr sz="3240"/>
+              <a:defRPr sz="2016"/>
             </a:lvl3pPr>
             <a:lvl4pPr>
-              <a:defRPr sz="2700"/>
+              <a:defRPr sz="1680"/>
             </a:lvl4pPr>
             <a:lvl5pPr>
-              <a:defRPr sz="2700"/>
+              <a:defRPr sz="1680"/>
             </a:lvl5pPr>
             <a:lvl6pPr>
-              <a:defRPr sz="2700"/>
+              <a:defRPr sz="1680"/>
             </a:lvl6pPr>
             <a:lvl7pPr>
-              <a:defRPr sz="2700"/>
+              <a:defRPr sz="1680"/>
             </a:lvl7pPr>
             <a:lvl8pPr>
-              <a:defRPr sz="2700"/>
+              <a:defRPr sz="1680"/>
             </a:lvl8pPr>
             <a:lvl9pPr>
-              <a:defRPr sz="2700"/>
+              <a:defRPr sz="1680"/>
             </a:lvl9pPr>
           </a:lstStyle>
           <a:p>
@@ -2469,8 +2469,8 @@
         </p:nvSpPr>
         <p:spPr>
           <a:xfrm>
-            <a:off x="1133714" y="2880360"/>
-            <a:ext cx="5308520" cy="5336223"/>
+            <a:off x="1070730" y="1728311"/>
+            <a:ext cx="5013602" cy="3201911"/>
           </a:xfrm>
         </p:spPr>
         <p:txBody>
@@ -2478,39 +2478,39 @@
           <a:lstStyle>
             <a:lvl1pPr marL="0" indent="0">
               <a:buNone/>
-              <a:defRPr sz="2160"/>
+              <a:defRPr sz="1344"/>
             </a:lvl1pPr>
-            <a:lvl2pPr marL="617220" indent="0">
+            <a:lvl2pPr marL="384048" indent="0">
               <a:buNone/>
-              <a:defRPr sz="1890"/>
+              <a:defRPr sz="1176"/>
             </a:lvl2pPr>
-            <a:lvl3pPr marL="1234440" indent="0">
+            <a:lvl3pPr marL="768096" indent="0">
               <a:buNone/>
-              <a:defRPr sz="1620"/>
+              <a:defRPr sz="1008"/>
             </a:lvl3pPr>
-            <a:lvl4pPr marL="1851660" indent="0">
+            <a:lvl4pPr marL="1152144" indent="0">
               <a:buNone/>
-              <a:defRPr sz="1350"/>
+              <a:defRPr sz="840"/>
             </a:lvl4pPr>
-            <a:lvl5pPr marL="2468880" indent="0">
+            <a:lvl5pPr marL="1536192" indent="0">
               <a:buNone/>
-              <a:defRPr sz="1350"/>
+              <a:defRPr sz="840"/>
             </a:lvl5pPr>
-            <a:lvl6pPr marL="3086100" indent="0">
+            <a:lvl6pPr marL="1920240" indent="0">
               <a:buNone/>
-              <a:defRPr sz="1350"/>
+              <a:defRPr sz="840"/>
             </a:lvl6pPr>
-            <a:lvl7pPr marL="3703320" indent="0">
+            <a:lvl7pPr marL="2304288" indent="0">
               <a:buNone/>
-              <a:defRPr sz="1350"/>
+              <a:defRPr sz="840"/>
             </a:lvl7pPr>
-            <a:lvl8pPr marL="4320540" indent="0">
+            <a:lvl8pPr marL="2688336" indent="0">
               <a:buNone/>
-              <a:defRPr sz="1350"/>
+              <a:defRPr sz="840"/>
             </a:lvl8pPr>
-            <a:lvl9pPr marL="4937760" indent="0">
+            <a:lvl9pPr marL="3072384" indent="0">
               <a:buNone/>
-              <a:defRPr sz="1350"/>
+              <a:defRPr sz="840"/>
             </a:lvl9pPr>
           </a:lstStyle>
           <a:p>
@@ -2590,7 +2590,7 @@
     </p:spTree>
     <p:extLst>
       <p:ext uri="{BB962C8B-B14F-4D97-AF65-F5344CB8AC3E}">
-        <p14:creationId xmlns:p14="http://schemas.microsoft.com/office/powerpoint/2010/main" val="2634794252"/>
+        <p14:creationId xmlns:p14="http://schemas.microsoft.com/office/powerpoint/2010/main" val="1570068496"/>
       </p:ext>
     </p:extLst>
   </p:cSld>
@@ -2629,15 +2629,15 @@
         </p:nvSpPr>
         <p:spPr>
           <a:xfrm>
-            <a:off x="1133714" y="640080"/>
-            <a:ext cx="5308520" cy="2240280"/>
+            <a:off x="1070730" y="384069"/>
+            <a:ext cx="5013602" cy="1344242"/>
           </a:xfrm>
         </p:spPr>
         <p:txBody>
           <a:bodyPr anchor="b"/>
           <a:lstStyle>
             <a:lvl1pPr>
-              <a:defRPr sz="4320"/>
+              <a:defRPr sz="2688"/>
             </a:lvl1pPr>
           </a:lstStyle>
           <a:p>
@@ -2661,8 +2661,8 @@
         </p:nvSpPr>
         <p:spPr>
           <a:xfrm>
-            <a:off x="6997304" y="1382396"/>
-            <a:ext cx="8332470" cy="6823075"/>
+            <a:off x="6608565" y="829483"/>
+            <a:ext cx="7869555" cy="4094071"/>
           </a:xfrm>
         </p:spPr>
         <p:txBody>
@@ -2670,39 +2670,39 @@
           <a:lstStyle>
             <a:lvl1pPr marL="0" indent="0">
               <a:buNone/>
-              <a:defRPr sz="4320"/>
+              <a:defRPr sz="2688"/>
             </a:lvl1pPr>
-            <a:lvl2pPr marL="617220" indent="0">
+            <a:lvl2pPr marL="384048" indent="0">
               <a:buNone/>
-              <a:defRPr sz="3780"/>
+              <a:defRPr sz="2352"/>
             </a:lvl2pPr>
-            <a:lvl3pPr marL="1234440" indent="0">
+            <a:lvl3pPr marL="768096" indent="0">
               <a:buNone/>
-              <a:defRPr sz="3240"/>
+              <a:defRPr sz="2016"/>
             </a:lvl3pPr>
-            <a:lvl4pPr marL="1851660" indent="0">
+            <a:lvl4pPr marL="1152144" indent="0">
               <a:buNone/>
-              <a:defRPr sz="2700"/>
+              <a:defRPr sz="1680"/>
             </a:lvl4pPr>
-            <a:lvl5pPr marL="2468880" indent="0">
+            <a:lvl5pPr marL="1536192" indent="0">
               <a:buNone/>
-              <a:defRPr sz="2700"/>
+              <a:defRPr sz="1680"/>
             </a:lvl5pPr>
-            <a:lvl6pPr marL="3086100" indent="0">
+            <a:lvl6pPr marL="1920240" indent="0">
               <a:buNone/>
-              <a:defRPr sz="2700"/>
+              <a:defRPr sz="1680"/>
             </a:lvl6pPr>
-            <a:lvl7pPr marL="3703320" indent="0">
+            <a:lvl7pPr marL="2304288" indent="0">
               <a:buNone/>
-              <a:defRPr sz="2700"/>
+              <a:defRPr sz="1680"/>
             </a:lvl7pPr>
-            <a:lvl8pPr marL="4320540" indent="0">
+            <a:lvl8pPr marL="2688336" indent="0">
               <a:buNone/>
-              <a:defRPr sz="2700"/>
+              <a:defRPr sz="1680"/>
             </a:lvl8pPr>
-            <a:lvl9pPr marL="4937760" indent="0">
+            <a:lvl9pPr marL="3072384" indent="0">
               <a:buNone/>
-              <a:defRPr sz="2700"/>
+              <a:defRPr sz="1680"/>
             </a:lvl9pPr>
           </a:lstStyle>
           <a:p>
@@ -2726,8 +2726,8 @@
         </p:nvSpPr>
         <p:spPr>
           <a:xfrm>
-            <a:off x="1133714" y="2880360"/>
-            <a:ext cx="5308520" cy="5336223"/>
+            <a:off x="1070730" y="1728311"/>
+            <a:ext cx="5013602" cy="3201911"/>
           </a:xfrm>
         </p:spPr>
         <p:txBody>
@@ -2735,39 +2735,39 @@
           <a:lstStyle>
             <a:lvl1pPr marL="0" indent="0">
               <a:buNone/>
-              <a:defRPr sz="2160"/>
+              <a:defRPr sz="1344"/>
             </a:lvl1pPr>
-            <a:lvl2pPr marL="617220" indent="0">
+            <a:lvl2pPr marL="384048" indent="0">
               <a:buNone/>
-              <a:defRPr sz="1890"/>
+              <a:defRPr sz="1176"/>
             </a:lvl2pPr>
-            <a:lvl3pPr marL="1234440" indent="0">
+            <a:lvl3pPr marL="768096" indent="0">
               <a:buNone/>
-              <a:defRPr sz="1620"/>
+              <a:defRPr sz="1008"/>
             </a:lvl3pPr>
-            <a:lvl4pPr marL="1851660" indent="0">
+            <a:lvl4pPr marL="1152144" indent="0">
               <a:buNone/>
-              <a:defRPr sz="1350"/>
+              <a:defRPr sz="840"/>
             </a:lvl4pPr>
-            <a:lvl5pPr marL="2468880" indent="0">
+            <a:lvl5pPr marL="1536192" indent="0">
               <a:buNone/>
-              <a:defRPr sz="1350"/>
+              <a:defRPr sz="840"/>
             </a:lvl5pPr>
-            <a:lvl6pPr marL="3086100" indent="0">
+            <a:lvl6pPr marL="1920240" indent="0">
               <a:buNone/>
-              <a:defRPr sz="1350"/>
+              <a:defRPr sz="840"/>
             </a:lvl6pPr>
-            <a:lvl7pPr marL="3703320" indent="0">
+            <a:lvl7pPr marL="2304288" indent="0">
               <a:buNone/>
-              <a:defRPr sz="1350"/>
+              <a:defRPr sz="840"/>
             </a:lvl7pPr>
-            <a:lvl8pPr marL="4320540" indent="0">
+            <a:lvl8pPr marL="2688336" indent="0">
               <a:buNone/>
-              <a:defRPr sz="1350"/>
+              <a:defRPr sz="840"/>
             </a:lvl8pPr>
-            <a:lvl9pPr marL="4937760" indent="0">
+            <a:lvl9pPr marL="3072384" indent="0">
               <a:buNone/>
-              <a:defRPr sz="1350"/>
+              <a:defRPr sz="840"/>
             </a:lvl9pPr>
           </a:lstStyle>
           <a:p>
@@ -2847,7 +2847,7 @@
     </p:spTree>
     <p:extLst>
       <p:ext uri="{BB962C8B-B14F-4D97-AF65-F5344CB8AC3E}">
-        <p14:creationId xmlns:p14="http://schemas.microsoft.com/office/powerpoint/2010/main" val="3088564528"/>
+        <p14:creationId xmlns:p14="http://schemas.microsoft.com/office/powerpoint/2010/main" val="89908550"/>
       </p:ext>
     </p:extLst>
   </p:cSld>
@@ -2891,8 +2891,8 @@
         </p:nvSpPr>
         <p:spPr>
           <a:xfrm>
-            <a:off x="1131570" y="511176"/>
-            <a:ext cx="14196060" cy="1855788"/>
+            <a:off x="1068705" y="306723"/>
+            <a:ext cx="13407390" cy="1113534"/>
           </a:xfrm>
           <a:prstGeom prst="rect">
             <a:avLst/>
@@ -2924,8 +2924,8 @@
         </p:nvSpPr>
         <p:spPr>
           <a:xfrm>
-            <a:off x="1131570" y="2555875"/>
-            <a:ext cx="14196060" cy="6091873"/>
+            <a:off x="1068705" y="1533609"/>
+            <a:ext cx="13407390" cy="3655326"/>
           </a:xfrm>
           <a:prstGeom prst="rect">
             <a:avLst/>
@@ -2986,8 +2986,8 @@
         </p:nvSpPr>
         <p:spPr>
           <a:xfrm>
-            <a:off x="1131570" y="8898891"/>
-            <a:ext cx="3703320" cy="511175"/>
+            <a:off x="1068705" y="5339629"/>
+            <a:ext cx="3497580" cy="306722"/>
           </a:xfrm>
           <a:prstGeom prst="rect">
             <a:avLst/>
@@ -2997,7 +2997,7 @@
           <a:bodyPr vert="horz" lIns="91440" tIns="45720" rIns="91440" bIns="45720" rtlCol="0" anchor="ctr"/>
           <a:lstStyle>
             <a:lvl1pPr algn="l">
-              <a:defRPr sz="1620">
+              <a:defRPr sz="1008">
                 <a:solidFill>
                   <a:schemeClr val="tx1">
                     <a:tint val="75000"/>
@@ -3027,8 +3027,8 @@
         </p:nvSpPr>
         <p:spPr>
           <a:xfrm>
-            <a:off x="5452110" y="8898891"/>
-            <a:ext cx="5554980" cy="511175"/>
+            <a:off x="5149215" y="5339629"/>
+            <a:ext cx="5246370" cy="306722"/>
           </a:xfrm>
           <a:prstGeom prst="rect">
             <a:avLst/>
@@ -3038,7 +3038,7 @@
           <a:bodyPr vert="horz" lIns="91440" tIns="45720" rIns="91440" bIns="45720" rtlCol="0" anchor="ctr"/>
           <a:lstStyle>
             <a:lvl1pPr algn="ctr">
-              <a:defRPr sz="1620">
+              <a:defRPr sz="1008">
                 <a:solidFill>
                   <a:schemeClr val="tx1">
                     <a:tint val="75000"/>
@@ -3064,8 +3064,8 @@
         </p:nvSpPr>
         <p:spPr>
           <a:xfrm>
-            <a:off x="11624310" y="8898891"/>
-            <a:ext cx="3703320" cy="511175"/>
+            <a:off x="10978515" y="5339629"/>
+            <a:ext cx="3497580" cy="306722"/>
           </a:xfrm>
           <a:prstGeom prst="rect">
             <a:avLst/>
@@ -3075,7 +3075,7 @@
           <a:bodyPr vert="horz" lIns="91440" tIns="45720" rIns="91440" bIns="45720" rtlCol="0" anchor="ctr"/>
           <a:lstStyle>
             <a:lvl1pPr algn="r">
-              <a:defRPr sz="1620">
+              <a:defRPr sz="1008">
                 <a:solidFill>
                   <a:schemeClr val="tx1">
                     <a:tint val="75000"/>
@@ -3096,27 +3096,27 @@
     </p:spTree>
     <p:extLst>
       <p:ext uri="{BB962C8B-B14F-4D97-AF65-F5344CB8AC3E}">
-        <p14:creationId xmlns:p14="http://schemas.microsoft.com/office/powerpoint/2010/main" val="1767624253"/>
+        <p14:creationId xmlns:p14="http://schemas.microsoft.com/office/powerpoint/2010/main" val="3342763087"/>
       </p:ext>
     </p:extLst>
   </p:cSld>
   <p:clrMap bg1="lt1" tx1="dk1" bg2="lt2" tx2="dk2" accent1="accent1" accent2="accent2" accent3="accent3" accent4="accent4" accent5="accent5" accent6="accent6" hlink="hlink" folHlink="folHlink"/>
   <p:sldLayoutIdLst>
-    <p:sldLayoutId id="2147483817" r:id="rId1"/>
-    <p:sldLayoutId id="2147483818" r:id="rId2"/>
-    <p:sldLayoutId id="2147483819" r:id="rId3"/>
-    <p:sldLayoutId id="2147483820" r:id="rId4"/>
-    <p:sldLayoutId id="2147483821" r:id="rId5"/>
-    <p:sldLayoutId id="2147483822" r:id="rId6"/>
-    <p:sldLayoutId id="2147483823" r:id="rId7"/>
-    <p:sldLayoutId id="2147483824" r:id="rId8"/>
-    <p:sldLayoutId id="2147483825" r:id="rId9"/>
-    <p:sldLayoutId id="2147483826" r:id="rId10"/>
-    <p:sldLayoutId id="2147483827" r:id="rId11"/>
+    <p:sldLayoutId id="2147483889" r:id="rId1"/>
+    <p:sldLayoutId id="2147483890" r:id="rId2"/>
+    <p:sldLayoutId id="2147483891" r:id="rId3"/>
+    <p:sldLayoutId id="2147483892" r:id="rId4"/>
+    <p:sldLayoutId id="2147483893" r:id="rId5"/>
+    <p:sldLayoutId id="2147483894" r:id="rId6"/>
+    <p:sldLayoutId id="2147483895" r:id="rId7"/>
+    <p:sldLayoutId id="2147483896" r:id="rId8"/>
+    <p:sldLayoutId id="2147483897" r:id="rId9"/>
+    <p:sldLayoutId id="2147483898" r:id="rId10"/>
+    <p:sldLayoutId id="2147483899" r:id="rId11"/>
   </p:sldLayoutIdLst>
   <p:txStyles>
     <p:titleStyle>
-      <a:lvl1pPr algn="l" defTabSz="1234440" rtl="0" eaLnBrk="1" latinLnBrk="0" hangingPunct="1">
+      <a:lvl1pPr algn="l" defTabSz="768096" rtl="0" eaLnBrk="1" latinLnBrk="0" hangingPunct="1">
         <a:lnSpc>
           <a:spcPct val="90000"/>
         </a:lnSpc>
@@ -3124,7 +3124,7 @@
           <a:spcPct val="0"/>
         </a:spcBef>
         <a:buNone/>
-        <a:defRPr sz="5940" kern="1200">
+        <a:defRPr sz="3696" kern="1200">
           <a:solidFill>
             <a:schemeClr val="tx1"/>
           </a:solidFill>
@@ -3135,16 +3135,16 @@
       </a:lvl1pPr>
     </p:titleStyle>
     <p:bodyStyle>
-      <a:lvl1pPr marL="308610" indent="-308610" algn="l" defTabSz="1234440" rtl="0" eaLnBrk="1" latinLnBrk="0" hangingPunct="1">
+      <a:lvl1pPr marL="192024" indent="-192024" algn="l" defTabSz="768096" rtl="0" eaLnBrk="1" latinLnBrk="0" hangingPunct="1">
         <a:lnSpc>
           <a:spcPct val="90000"/>
         </a:lnSpc>
         <a:spcBef>
-          <a:spcPts val="1350"/>
+          <a:spcPts val="840"/>
         </a:spcBef>
         <a:buFont typeface="Arial" panose="020B0604020202020204" pitchFamily="34" charset="0"/>
         <a:buChar char="•"/>
-        <a:defRPr sz="3780" kern="1200">
+        <a:defRPr sz="2352" kern="1200">
           <a:solidFill>
             <a:schemeClr val="tx1"/>
           </a:solidFill>
@@ -3153,16 +3153,16 @@
           <a:cs typeface="+mn-cs"/>
         </a:defRPr>
       </a:lvl1pPr>
-      <a:lvl2pPr marL="925830" indent="-308610" algn="l" defTabSz="1234440" rtl="0" eaLnBrk="1" latinLnBrk="0" hangingPunct="1">
+      <a:lvl2pPr marL="576072" indent="-192024" algn="l" defTabSz="768096" rtl="0" eaLnBrk="1" latinLnBrk="0" hangingPunct="1">
         <a:lnSpc>
           <a:spcPct val="90000"/>
         </a:lnSpc>
         <a:spcBef>
-          <a:spcPts val="675"/>
+          <a:spcPts val="420"/>
         </a:spcBef>
         <a:buFont typeface="Arial" panose="020B0604020202020204" pitchFamily="34" charset="0"/>
         <a:buChar char="•"/>
-        <a:defRPr sz="3240" kern="1200">
+        <a:defRPr sz="2016" kern="1200">
           <a:solidFill>
             <a:schemeClr val="tx1"/>
           </a:solidFill>
@@ -3171,16 +3171,16 @@
           <a:cs typeface="+mn-cs"/>
         </a:defRPr>
       </a:lvl2pPr>
-      <a:lvl3pPr marL="1543050" indent="-308610" algn="l" defTabSz="1234440" rtl="0" eaLnBrk="1" latinLnBrk="0" hangingPunct="1">
+      <a:lvl3pPr marL="960120" indent="-192024" algn="l" defTabSz="768096" rtl="0" eaLnBrk="1" latinLnBrk="0" hangingPunct="1">
         <a:lnSpc>
           <a:spcPct val="90000"/>
         </a:lnSpc>
         <a:spcBef>
-          <a:spcPts val="675"/>
+          <a:spcPts val="420"/>
         </a:spcBef>
         <a:buFont typeface="Arial" panose="020B0604020202020204" pitchFamily="34" charset="0"/>
         <a:buChar char="•"/>
-        <a:defRPr sz="2700" kern="1200">
+        <a:defRPr sz="1680" kern="1200">
           <a:solidFill>
             <a:schemeClr val="tx1"/>
           </a:solidFill>
@@ -3189,16 +3189,16 @@
           <a:cs typeface="+mn-cs"/>
         </a:defRPr>
       </a:lvl3pPr>
-      <a:lvl4pPr marL="2160270" indent="-308610" algn="l" defTabSz="1234440" rtl="0" eaLnBrk="1" latinLnBrk="0" hangingPunct="1">
+      <a:lvl4pPr marL="1344168" indent="-192024" algn="l" defTabSz="768096" rtl="0" eaLnBrk="1" latinLnBrk="0" hangingPunct="1">
         <a:lnSpc>
           <a:spcPct val="90000"/>
         </a:lnSpc>
         <a:spcBef>
-          <a:spcPts val="675"/>
+          <a:spcPts val="420"/>
         </a:spcBef>
         <a:buFont typeface="Arial" panose="020B0604020202020204" pitchFamily="34" charset="0"/>
         <a:buChar char="•"/>
-        <a:defRPr sz="2430" kern="1200">
+        <a:defRPr sz="1512" kern="1200">
           <a:solidFill>
             <a:schemeClr val="tx1"/>
           </a:solidFill>
@@ -3207,16 +3207,16 @@
           <a:cs typeface="+mn-cs"/>
         </a:defRPr>
       </a:lvl4pPr>
-      <a:lvl5pPr marL="2777490" indent="-308610" algn="l" defTabSz="1234440" rtl="0" eaLnBrk="1" latinLnBrk="0" hangingPunct="1">
+      <a:lvl5pPr marL="1728216" indent="-192024" algn="l" defTabSz="768096" rtl="0" eaLnBrk="1" latinLnBrk="0" hangingPunct="1">
         <a:lnSpc>
           <a:spcPct val="90000"/>
         </a:lnSpc>
         <a:spcBef>
-          <a:spcPts val="675"/>
+          <a:spcPts val="420"/>
         </a:spcBef>
         <a:buFont typeface="Arial" panose="020B0604020202020204" pitchFamily="34" charset="0"/>
         <a:buChar char="•"/>
-        <a:defRPr sz="2430" kern="1200">
+        <a:defRPr sz="1512" kern="1200">
           <a:solidFill>
             <a:schemeClr val="tx1"/>
           </a:solidFill>
@@ -3225,16 +3225,16 @@
           <a:cs typeface="+mn-cs"/>
         </a:defRPr>
       </a:lvl5pPr>
-      <a:lvl6pPr marL="3394710" indent="-308610" algn="l" defTabSz="1234440" rtl="0" eaLnBrk="1" latinLnBrk="0" hangingPunct="1">
+      <a:lvl6pPr marL="2112264" indent="-192024" algn="l" defTabSz="768096" rtl="0" eaLnBrk="1" latinLnBrk="0" hangingPunct="1">
         <a:lnSpc>
           <a:spcPct val="90000"/>
         </a:lnSpc>
         <a:spcBef>
-          <a:spcPts val="675"/>
+          <a:spcPts val="420"/>
         </a:spcBef>
         <a:buFont typeface="Arial" panose="020B0604020202020204" pitchFamily="34" charset="0"/>
         <a:buChar char="•"/>
-        <a:defRPr sz="2430" kern="1200">
+        <a:defRPr sz="1512" kern="1200">
           <a:solidFill>
             <a:schemeClr val="tx1"/>
           </a:solidFill>
@@ -3243,16 +3243,16 @@
           <a:cs typeface="+mn-cs"/>
         </a:defRPr>
       </a:lvl6pPr>
-      <a:lvl7pPr marL="4011930" indent="-308610" algn="l" defTabSz="1234440" rtl="0" eaLnBrk="1" latinLnBrk="0" hangingPunct="1">
+      <a:lvl7pPr marL="2496312" indent="-192024" algn="l" defTabSz="768096" rtl="0" eaLnBrk="1" latinLnBrk="0" hangingPunct="1">
         <a:lnSpc>
           <a:spcPct val="90000"/>
         </a:lnSpc>
         <a:spcBef>
-          <a:spcPts val="675"/>
+          <a:spcPts val="420"/>
         </a:spcBef>
         <a:buFont typeface="Arial" panose="020B0604020202020204" pitchFamily="34" charset="0"/>
         <a:buChar char="•"/>
-        <a:defRPr sz="2430" kern="1200">
+        <a:defRPr sz="1512" kern="1200">
           <a:solidFill>
             <a:schemeClr val="tx1"/>
           </a:solidFill>
@@ -3261,16 +3261,16 @@
           <a:cs typeface="+mn-cs"/>
         </a:defRPr>
       </a:lvl7pPr>
-      <a:lvl8pPr marL="4629150" indent="-308610" algn="l" defTabSz="1234440" rtl="0" eaLnBrk="1" latinLnBrk="0" hangingPunct="1">
+      <a:lvl8pPr marL="2880360" indent="-192024" algn="l" defTabSz="768096" rtl="0" eaLnBrk="1" latinLnBrk="0" hangingPunct="1">
         <a:lnSpc>
           <a:spcPct val="90000"/>
         </a:lnSpc>
         <a:spcBef>
-          <a:spcPts val="675"/>
+          <a:spcPts val="420"/>
         </a:spcBef>
         <a:buFont typeface="Arial" panose="020B0604020202020204" pitchFamily="34" charset="0"/>
         <a:buChar char="•"/>
-        <a:defRPr sz="2430" kern="1200">
+        <a:defRPr sz="1512" kern="1200">
           <a:solidFill>
             <a:schemeClr val="tx1"/>
           </a:solidFill>
@@ -3279,16 +3279,16 @@
           <a:cs typeface="+mn-cs"/>
         </a:defRPr>
       </a:lvl8pPr>
-      <a:lvl9pPr marL="5246370" indent="-308610" algn="l" defTabSz="1234440" rtl="0" eaLnBrk="1" latinLnBrk="0" hangingPunct="1">
+      <a:lvl9pPr marL="3264408" indent="-192024" algn="l" defTabSz="768096" rtl="0" eaLnBrk="1" latinLnBrk="0" hangingPunct="1">
         <a:lnSpc>
           <a:spcPct val="90000"/>
         </a:lnSpc>
         <a:spcBef>
-          <a:spcPts val="675"/>
+          <a:spcPts val="420"/>
         </a:spcBef>
         <a:buFont typeface="Arial" panose="020B0604020202020204" pitchFamily="34" charset="0"/>
         <a:buChar char="•"/>
-        <a:defRPr sz="2430" kern="1200">
+        <a:defRPr sz="1512" kern="1200">
           <a:solidFill>
             <a:schemeClr val="tx1"/>
           </a:solidFill>
@@ -3302,8 +3302,8 @@
       <a:defPPr>
         <a:defRPr lang="en-US"/>
       </a:defPPr>
-      <a:lvl1pPr marL="0" algn="l" defTabSz="1234440" rtl="0" eaLnBrk="1" latinLnBrk="0" hangingPunct="1">
-        <a:defRPr sz="2430" kern="1200">
+      <a:lvl1pPr marL="0" algn="l" defTabSz="768096" rtl="0" eaLnBrk="1" latinLnBrk="0" hangingPunct="1">
+        <a:defRPr sz="1512" kern="1200">
           <a:solidFill>
             <a:schemeClr val="tx1"/>
           </a:solidFill>
@@ -3312,8 +3312,8 @@
           <a:cs typeface="+mn-cs"/>
         </a:defRPr>
       </a:lvl1pPr>
-      <a:lvl2pPr marL="617220" algn="l" defTabSz="1234440" rtl="0" eaLnBrk="1" latinLnBrk="0" hangingPunct="1">
-        <a:defRPr sz="2430" kern="1200">
+      <a:lvl2pPr marL="384048" algn="l" defTabSz="768096" rtl="0" eaLnBrk="1" latinLnBrk="0" hangingPunct="1">
+        <a:defRPr sz="1512" kern="1200">
           <a:solidFill>
             <a:schemeClr val="tx1"/>
           </a:solidFill>
@@ -3322,8 +3322,8 @@
           <a:cs typeface="+mn-cs"/>
         </a:defRPr>
       </a:lvl2pPr>
-      <a:lvl3pPr marL="1234440" algn="l" defTabSz="1234440" rtl="0" eaLnBrk="1" latinLnBrk="0" hangingPunct="1">
-        <a:defRPr sz="2430" kern="1200">
+      <a:lvl3pPr marL="768096" algn="l" defTabSz="768096" rtl="0" eaLnBrk="1" latinLnBrk="0" hangingPunct="1">
+        <a:defRPr sz="1512" kern="1200">
           <a:solidFill>
             <a:schemeClr val="tx1"/>
           </a:solidFill>
@@ -3332,8 +3332,8 @@
           <a:cs typeface="+mn-cs"/>
         </a:defRPr>
       </a:lvl3pPr>
-      <a:lvl4pPr marL="1851660" algn="l" defTabSz="1234440" rtl="0" eaLnBrk="1" latinLnBrk="0" hangingPunct="1">
-        <a:defRPr sz="2430" kern="1200">
+      <a:lvl4pPr marL="1152144" algn="l" defTabSz="768096" rtl="0" eaLnBrk="1" latinLnBrk="0" hangingPunct="1">
+        <a:defRPr sz="1512" kern="1200">
           <a:solidFill>
             <a:schemeClr val="tx1"/>
           </a:solidFill>
@@ -3342,8 +3342,8 @@
           <a:cs typeface="+mn-cs"/>
         </a:defRPr>
       </a:lvl4pPr>
-      <a:lvl5pPr marL="2468880" algn="l" defTabSz="1234440" rtl="0" eaLnBrk="1" latinLnBrk="0" hangingPunct="1">
-        <a:defRPr sz="2430" kern="1200">
+      <a:lvl5pPr marL="1536192" algn="l" defTabSz="768096" rtl="0" eaLnBrk="1" latinLnBrk="0" hangingPunct="1">
+        <a:defRPr sz="1512" kern="1200">
           <a:solidFill>
             <a:schemeClr val="tx1"/>
           </a:solidFill>
@@ -3352,8 +3352,8 @@
           <a:cs typeface="+mn-cs"/>
         </a:defRPr>
       </a:lvl5pPr>
-      <a:lvl6pPr marL="3086100" algn="l" defTabSz="1234440" rtl="0" eaLnBrk="1" latinLnBrk="0" hangingPunct="1">
-        <a:defRPr sz="2430" kern="1200">
+      <a:lvl6pPr marL="1920240" algn="l" defTabSz="768096" rtl="0" eaLnBrk="1" latinLnBrk="0" hangingPunct="1">
+        <a:defRPr sz="1512" kern="1200">
           <a:solidFill>
             <a:schemeClr val="tx1"/>
           </a:solidFill>
@@ -3362,8 +3362,8 @@
           <a:cs typeface="+mn-cs"/>
         </a:defRPr>
       </a:lvl6pPr>
-      <a:lvl7pPr marL="3703320" algn="l" defTabSz="1234440" rtl="0" eaLnBrk="1" latinLnBrk="0" hangingPunct="1">
-        <a:defRPr sz="2430" kern="1200">
+      <a:lvl7pPr marL="2304288" algn="l" defTabSz="768096" rtl="0" eaLnBrk="1" latinLnBrk="0" hangingPunct="1">
+        <a:defRPr sz="1512" kern="1200">
           <a:solidFill>
             <a:schemeClr val="tx1"/>
           </a:solidFill>
@@ -3372,8 +3372,8 @@
           <a:cs typeface="+mn-cs"/>
         </a:defRPr>
       </a:lvl7pPr>
-      <a:lvl8pPr marL="4320540" algn="l" defTabSz="1234440" rtl="0" eaLnBrk="1" latinLnBrk="0" hangingPunct="1">
-        <a:defRPr sz="2430" kern="1200">
+      <a:lvl8pPr marL="2688336" algn="l" defTabSz="768096" rtl="0" eaLnBrk="1" latinLnBrk="0" hangingPunct="1">
+        <a:defRPr sz="1512" kern="1200">
           <a:solidFill>
             <a:schemeClr val="tx1"/>
           </a:solidFill>
@@ -3382,8 +3382,8 @@
           <a:cs typeface="+mn-cs"/>
         </a:defRPr>
       </a:lvl8pPr>
-      <a:lvl9pPr marL="4937760" algn="l" defTabSz="1234440" rtl="0" eaLnBrk="1" latinLnBrk="0" hangingPunct="1">
-        <a:defRPr sz="2430" kern="1200">
+      <a:lvl9pPr marL="3072384" algn="l" defTabSz="768096" rtl="0" eaLnBrk="1" latinLnBrk="0" hangingPunct="1">
+        <a:defRPr sz="1512" kern="1200">
           <a:solidFill>
             <a:schemeClr val="tx1"/>
           </a:solidFill>
@@ -3428,7 +3428,7 @@
         </p:nvSpPr>
         <p:spPr>
           <a:xfrm>
-            <a:off x="8723579" y="2999518"/>
+            <a:off x="8455495" y="2880143"/>
             <a:ext cx="4979556" cy="502766"/>
           </a:xfrm>
           <a:prstGeom prst="rect">
@@ -3470,7 +3470,7 @@
         </p:nvSpPr>
         <p:spPr>
           <a:xfrm>
-            <a:off x="8720520" y="1893664"/>
+            <a:off x="8452436" y="1774289"/>
             <a:ext cx="4979556" cy="502766"/>
           </a:xfrm>
           <a:prstGeom prst="rect">
@@ -3535,7 +3535,7 @@
         </p:nvCxnSpPr>
         <p:spPr>
           <a:xfrm>
-            <a:off x="7495108" y="2145047"/>
+            <a:off x="7227024" y="2025672"/>
             <a:ext cx="1293154" cy="0"/>
           </a:xfrm>
           <a:prstGeom prst="line">
@@ -3576,7 +3576,7 @@
         </p:nvSpPr>
         <p:spPr>
           <a:xfrm>
-            <a:off x="8720530" y="3481143"/>
+            <a:off x="8452452" y="3361768"/>
             <a:ext cx="4886963" cy="502766"/>
           </a:xfrm>
           <a:prstGeom prst="rect">
@@ -3615,7 +3615,7 @@
         </p:nvCxnSpPr>
         <p:spPr>
           <a:xfrm>
-            <a:off x="13514886" y="2145047"/>
+            <a:off x="13246808" y="2025672"/>
             <a:ext cx="1325495" cy="0"/>
           </a:xfrm>
           <a:prstGeom prst="line">
@@ -3658,7 +3658,7 @@
         </p:nvCxnSpPr>
         <p:spPr>
           <a:xfrm flipV="1">
-            <a:off x="14381037" y="2439688"/>
+            <a:off x="14112953" y="2320313"/>
             <a:ext cx="459342" cy="5118"/>
           </a:xfrm>
           <a:prstGeom prst="line">
@@ -3701,7 +3701,7 @@
         </p:nvCxnSpPr>
         <p:spPr>
           <a:xfrm flipV="1">
-            <a:off x="12973490" y="1528040"/>
+            <a:off x="12705406" y="1408670"/>
             <a:ext cx="0" cy="408949"/>
           </a:xfrm>
           <a:prstGeom prst="straightConnector1">
@@ -3745,7 +3745,7 @@
         </p:nvSpPr>
         <p:spPr>
           <a:xfrm>
-            <a:off x="12165089" y="1194986"/>
+            <a:off x="11897011" y="1075616"/>
             <a:ext cx="1690385" cy="353943"/>
           </a:xfrm>
           <a:prstGeom prst="rect">
@@ -3787,7 +3787,7 @@
         </p:nvSpPr>
         <p:spPr>
           <a:xfrm>
-            <a:off x="355882" y="2114546"/>
+            <a:off x="87801" y="1995177"/>
             <a:ext cx="1080813" cy="387927"/>
           </a:xfrm>
           <a:prstGeom prst="rect">
@@ -3823,7 +3823,7 @@
         </p:nvSpPr>
         <p:spPr>
           <a:xfrm>
-            <a:off x="14582706" y="1839897"/>
+            <a:off x="14314628" y="1720522"/>
             <a:ext cx="1080813" cy="338554"/>
           </a:xfrm>
           <a:prstGeom prst="rect">
@@ -3858,7 +3858,7 @@
         </p:nvSpPr>
         <p:spPr>
           <a:xfrm>
-            <a:off x="14582706" y="2425249"/>
+            <a:off x="14314628" y="2305874"/>
             <a:ext cx="1080813" cy="338554"/>
           </a:xfrm>
           <a:prstGeom prst="rect">
@@ -3893,7 +3893,7 @@
         </p:nvSpPr>
         <p:spPr>
           <a:xfrm>
-            <a:off x="7436342" y="1839897"/>
+            <a:off x="7168258" y="1720522"/>
             <a:ext cx="368278" cy="338554"/>
           </a:xfrm>
           <a:prstGeom prst="rect">
@@ -3928,7 +3928,7 @@
         </p:nvSpPr>
         <p:spPr>
           <a:xfrm>
-            <a:off x="7436342" y="2425249"/>
+            <a:off x="7168258" y="2305874"/>
             <a:ext cx="435702" cy="338554"/>
           </a:xfrm>
           <a:prstGeom prst="rect">
@@ -3965,8 +3965,8 @@
         </p:nvCxnSpPr>
         <p:spPr>
           <a:xfrm flipH="1">
-            <a:off x="3670114" y="74342"/>
-            <a:ext cx="6542" cy="9385711"/>
+            <a:off x="3404795" y="-45030"/>
+            <a:ext cx="3783" cy="5861763"/>
           </a:xfrm>
           <a:prstGeom prst="line">
             <a:avLst/>
@@ -4008,8 +4008,8 @@
         </p:nvCxnSpPr>
         <p:spPr>
           <a:xfrm>
-            <a:off x="4713926" y="74342"/>
-            <a:ext cx="0" cy="9401477"/>
+            <a:off x="4445842" y="-45030"/>
+            <a:ext cx="0" cy="5861763"/>
           </a:xfrm>
           <a:prstGeom prst="line">
             <a:avLst/>
@@ -4049,7 +4049,7 @@
         </p:nvSpPr>
         <p:spPr>
           <a:xfrm>
-            <a:off x="360376" y="304588"/>
+            <a:off x="92295" y="186091"/>
             <a:ext cx="1037465" cy="369332"/>
           </a:xfrm>
           <a:prstGeom prst="rect">
@@ -4084,7 +4084,7 @@
         </p:nvSpPr>
         <p:spPr>
           <a:xfrm>
-            <a:off x="10567636" y="304588"/>
+            <a:off x="10299552" y="186091"/>
             <a:ext cx="1929374" cy="369332"/>
           </a:xfrm>
           <a:prstGeom prst="rect">
@@ -4121,8 +4121,8 @@
         </p:nvCxnSpPr>
         <p:spPr>
           <a:xfrm flipH="1">
-            <a:off x="227344" y="928271"/>
-            <a:ext cx="15949946" cy="0"/>
+            <a:off x="87801" y="808896"/>
+            <a:ext cx="15417061" cy="0"/>
           </a:xfrm>
           <a:prstGeom prst="line">
             <a:avLst/>
@@ -4162,7 +4162,7 @@
         </p:nvSpPr>
         <p:spPr>
           <a:xfrm>
-            <a:off x="4820434" y="166089"/>
+            <a:off x="4552350" y="47596"/>
             <a:ext cx="669414" cy="646331"/>
           </a:xfrm>
           <a:prstGeom prst="rect">
@@ -4204,7 +4204,7 @@
         </p:nvSpPr>
         <p:spPr>
           <a:xfrm>
-            <a:off x="4631915" y="2114546"/>
+            <a:off x="4363837" y="1995177"/>
             <a:ext cx="1080813" cy="387927"/>
           </a:xfrm>
           <a:prstGeom prst="rect">
@@ -4242,8 +4242,8 @@
         </p:nvCxnSpPr>
         <p:spPr>
           <a:xfrm>
-            <a:off x="5584748" y="74342"/>
-            <a:ext cx="0" cy="9401477"/>
+            <a:off x="5316664" y="-45030"/>
+            <a:ext cx="0" cy="5861763"/>
           </a:xfrm>
           <a:prstGeom prst="line">
             <a:avLst/>
@@ -4285,8 +4285,8 @@
         </p:nvCxnSpPr>
         <p:spPr>
           <a:xfrm>
-            <a:off x="6626008" y="74342"/>
-            <a:ext cx="0" cy="9349160"/>
+            <a:off x="6357924" y="-45030"/>
+            <a:ext cx="0" cy="5861763"/>
           </a:xfrm>
           <a:prstGeom prst="line">
             <a:avLst/>
@@ -4326,7 +4326,7 @@
         </p:nvSpPr>
         <p:spPr>
           <a:xfrm>
-            <a:off x="5678154" y="166089"/>
+            <a:off x="5410070" y="47596"/>
             <a:ext cx="869148" cy="646331"/>
           </a:xfrm>
           <a:prstGeom prst="rect">
@@ -4368,7 +4368,7 @@
         </p:nvSpPr>
         <p:spPr>
           <a:xfrm>
-            <a:off x="5732027" y="2114546"/>
+            <a:off x="5463943" y="1995177"/>
             <a:ext cx="795762" cy="387927"/>
           </a:xfrm>
           <a:prstGeom prst="rect">
@@ -4406,8 +4406,8 @@
         </p:nvCxnSpPr>
         <p:spPr>
           <a:xfrm>
-            <a:off x="1535054" y="74342"/>
-            <a:ext cx="0" cy="9375203"/>
+            <a:off x="1266970" y="-45030"/>
+            <a:ext cx="0" cy="5861763"/>
           </a:xfrm>
           <a:prstGeom prst="line">
             <a:avLst/>
@@ -4449,7 +4449,7 @@
         </p:nvCxnSpPr>
         <p:spPr>
           <a:xfrm>
-            <a:off x="8489539" y="3258342"/>
+            <a:off x="8221461" y="3138967"/>
             <a:ext cx="298723" cy="0"/>
           </a:xfrm>
           <a:prstGeom prst="line">
@@ -4492,7 +4492,7 @@
         </p:nvCxnSpPr>
         <p:spPr>
           <a:xfrm>
-            <a:off x="8150919" y="2475839"/>
+            <a:off x="7882835" y="2356464"/>
             <a:ext cx="338620" cy="1256712"/>
           </a:xfrm>
           <a:prstGeom prst="line">
@@ -4535,7 +4535,7 @@
         </p:nvCxnSpPr>
         <p:spPr>
           <a:xfrm>
-            <a:off x="7495108" y="2469584"/>
+            <a:off x="7227030" y="2350209"/>
             <a:ext cx="666401" cy="0"/>
           </a:xfrm>
           <a:prstGeom prst="line">
@@ -4576,7 +4576,7 @@
         </p:nvSpPr>
         <p:spPr>
           <a:xfrm>
-            <a:off x="12798568" y="3486143"/>
+            <a:off x="12530484" y="3366768"/>
             <a:ext cx="851682" cy="502766"/>
           </a:xfrm>
           <a:prstGeom prst="rect">
@@ -4615,7 +4615,7 @@
         </p:nvCxnSpPr>
         <p:spPr>
           <a:xfrm flipH="1">
-            <a:off x="13514887" y="2439688"/>
+            <a:off x="13246803" y="2320319"/>
             <a:ext cx="866150" cy="1292863"/>
           </a:xfrm>
           <a:prstGeom prst="line">
@@ -4658,7 +4658,7 @@
         </p:nvCxnSpPr>
         <p:spPr>
           <a:xfrm>
-            <a:off x="8492453" y="3727375"/>
+            <a:off x="8224375" y="3608006"/>
             <a:ext cx="253721" cy="1"/>
           </a:xfrm>
           <a:prstGeom prst="line">
@@ -4701,7 +4701,7 @@
         </p:nvCxnSpPr>
         <p:spPr>
           <a:xfrm>
-            <a:off x="12937878" y="3248167"/>
+            <a:off x="12669800" y="3128798"/>
             <a:ext cx="253721" cy="1"/>
           </a:xfrm>
           <a:prstGeom prst="line">
@@ -4742,7 +4742,7 @@
         </p:nvSpPr>
         <p:spPr>
           <a:xfrm>
-            <a:off x="8569580" y="2952253"/>
+            <a:off x="8301496" y="2832878"/>
             <a:ext cx="368278" cy="338554"/>
           </a:xfrm>
           <a:prstGeom prst="rect">
@@ -4777,7 +4777,7 @@
         </p:nvSpPr>
         <p:spPr>
           <a:xfrm>
-            <a:off x="12847559" y="2952253"/>
+            <a:off x="12579475" y="2832878"/>
             <a:ext cx="368278" cy="338554"/>
           </a:xfrm>
           <a:prstGeom prst="rect">
@@ -4812,7 +4812,7 @@
         </p:nvGrpSpPr>
         <p:grpSpPr>
           <a:xfrm>
-            <a:off x="8898757" y="3386746"/>
+            <a:off x="8630679" y="3267377"/>
             <a:ext cx="3865401" cy="179803"/>
             <a:chOff x="2537530" y="2602325"/>
             <a:chExt cx="3623813" cy="168565"/>
@@ -5693,7 +5693,7 @@
         </p:nvSpPr>
         <p:spPr>
           <a:xfrm>
-            <a:off x="10277833" y="2839190"/>
+            <a:off x="10009755" y="2719821"/>
             <a:ext cx="1080813" cy="353943"/>
           </a:xfrm>
           <a:prstGeom prst="rect">
@@ -5735,7 +5735,7 @@
         </p:nvSpPr>
         <p:spPr>
           <a:xfrm>
-            <a:off x="12955419" y="3049836"/>
+            <a:off x="12687341" y="2930467"/>
             <a:ext cx="1080813" cy="353943"/>
           </a:xfrm>
           <a:prstGeom prst="rect">
@@ -5771,7 +5771,7 @@
         </p:nvSpPr>
         <p:spPr>
           <a:xfrm>
-            <a:off x="14692130" y="2075513"/>
+            <a:off x="14424052" y="1956144"/>
             <a:ext cx="1080813" cy="353943"/>
           </a:xfrm>
           <a:prstGeom prst="rect">
@@ -5807,7 +5807,7 @@
         </p:nvSpPr>
         <p:spPr>
           <a:xfrm>
-            <a:off x="8720520" y="2231629"/>
+            <a:off x="8452436" y="2112254"/>
             <a:ext cx="1847116" cy="502766"/>
           </a:xfrm>
           <a:prstGeom prst="rect">
@@ -5851,7 +5851,7 @@
         </p:nvCxnSpPr>
         <p:spPr>
           <a:xfrm flipH="1" flipV="1">
-            <a:off x="8130521" y="1603968"/>
+            <a:off x="7862437" y="1484593"/>
             <a:ext cx="598304" cy="889488"/>
           </a:xfrm>
           <a:prstGeom prst="straightConnector1">
@@ -5896,7 +5896,7 @@
         </p:nvSpPr>
         <p:spPr>
           <a:xfrm>
-            <a:off x="7511217" y="1246898"/>
+            <a:off x="7243133" y="1127528"/>
             <a:ext cx="1130636" cy="353943"/>
           </a:xfrm>
           <a:prstGeom prst="rect">
@@ -5938,7 +5938,7 @@
         </p:nvSpPr>
         <p:spPr>
           <a:xfrm>
-            <a:off x="8750672" y="1620551"/>
+            <a:off x="8482594" y="1501182"/>
             <a:ext cx="1690385" cy="353943"/>
           </a:xfrm>
           <a:prstGeom prst="rect">
@@ -5978,7 +5978,7 @@
         </p:nvSpPr>
         <p:spPr>
           <a:xfrm>
-            <a:off x="3798052" y="166089"/>
+            <a:off x="3499988" y="47596"/>
             <a:ext cx="881780" cy="646331"/>
           </a:xfrm>
           <a:prstGeom prst="rect">
@@ -6020,7 +6020,7 @@
         </p:nvSpPr>
         <p:spPr>
           <a:xfrm>
-            <a:off x="3623451" y="2114546"/>
+            <a:off x="3355367" y="1995177"/>
             <a:ext cx="1173078" cy="387927"/>
           </a:xfrm>
           <a:prstGeom prst="rect">
@@ -6056,7 +6056,7 @@
         </p:nvSpPr>
         <p:spPr>
           <a:xfrm>
-            <a:off x="8743554" y="4650299"/>
+            <a:off x="8475470" y="4530924"/>
             <a:ext cx="4979556" cy="502766"/>
           </a:xfrm>
           <a:prstGeom prst="rect">
@@ -6125,7 +6125,7 @@
         </p:nvCxnSpPr>
         <p:spPr>
           <a:xfrm>
-            <a:off x="7518142" y="4901682"/>
+            <a:off x="7250058" y="4782307"/>
             <a:ext cx="1293154" cy="0"/>
           </a:xfrm>
           <a:prstGeom prst="line">
@@ -6168,7 +6168,7 @@
         </p:nvCxnSpPr>
         <p:spPr>
           <a:xfrm>
-            <a:off x="13537920" y="4901682"/>
+            <a:off x="13269842" y="4782307"/>
             <a:ext cx="1325495" cy="0"/>
           </a:xfrm>
           <a:prstGeom prst="line">
@@ -6211,7 +6211,7 @@
         </p:nvCxnSpPr>
         <p:spPr>
           <a:xfrm>
-            <a:off x="7513097" y="5388969"/>
+            <a:off x="7245013" y="5269594"/>
             <a:ext cx="1293154" cy="0"/>
           </a:xfrm>
           <a:prstGeom prst="line">
@@ -6254,7 +6254,7 @@
         </p:nvCxnSpPr>
         <p:spPr>
           <a:xfrm>
-            <a:off x="13532875" y="5388969"/>
+            <a:off x="13264797" y="5269594"/>
             <a:ext cx="1325495" cy="0"/>
           </a:xfrm>
           <a:prstGeom prst="line">
@@ -6295,7 +6295,7 @@
         </p:nvSpPr>
         <p:spPr>
           <a:xfrm>
-            <a:off x="8743554" y="5134016"/>
+            <a:off x="8475476" y="5014641"/>
             <a:ext cx="4886963" cy="502766"/>
           </a:xfrm>
           <a:prstGeom prst="rect">
@@ -6362,7 +6362,7 @@
         </p:nvGrpSpPr>
         <p:grpSpPr>
           <a:xfrm>
-            <a:off x="8920925" y="5043890"/>
+            <a:off x="8652847" y="4924521"/>
             <a:ext cx="3865401" cy="179803"/>
             <a:chOff x="2537530" y="2602325"/>
             <a:chExt cx="3623813" cy="168565"/>
@@ -7243,7 +7243,7 @@
         </p:nvSpPr>
         <p:spPr>
           <a:xfrm>
-            <a:off x="14823446" y="4838287"/>
+            <a:off x="14555368" y="4718918"/>
             <a:ext cx="1080813" cy="615553"/>
           </a:xfrm>
           <a:prstGeom prst="rect">
@@ -7286,7 +7286,7 @@
         </p:nvSpPr>
         <p:spPr>
           <a:xfrm>
-            <a:off x="14636968" y="4613759"/>
+            <a:off x="14368890" y="4494384"/>
             <a:ext cx="1080813" cy="338554"/>
           </a:xfrm>
           <a:prstGeom prst="rect">
@@ -7321,7 +7321,7 @@
         </p:nvSpPr>
         <p:spPr>
           <a:xfrm>
-            <a:off x="14636968" y="5343042"/>
+            <a:off x="14368890" y="5223667"/>
             <a:ext cx="1080813" cy="338554"/>
           </a:xfrm>
           <a:prstGeom prst="rect">
@@ -7356,7 +7356,7 @@
         </p:nvSpPr>
         <p:spPr>
           <a:xfrm>
-            <a:off x="7465755" y="4613759"/>
+            <a:off x="7197671" y="4494384"/>
             <a:ext cx="368278" cy="338554"/>
           </a:xfrm>
           <a:prstGeom prst="rect">
@@ -7391,7 +7391,7 @@
         </p:nvSpPr>
         <p:spPr>
           <a:xfrm>
-            <a:off x="7465755" y="5343042"/>
+            <a:off x="7197671" y="5223667"/>
             <a:ext cx="435702" cy="338554"/>
           </a:xfrm>
           <a:prstGeom prst="rect">
@@ -7426,8 +7426,8 @@
         </p:nvSpPr>
         <p:spPr>
           <a:xfrm>
-            <a:off x="2808030" y="166089"/>
-            <a:ext cx="835485" cy="646331"/>
+            <a:off x="2450865" y="47596"/>
+            <a:ext cx="1042978" cy="646331"/>
           </a:xfrm>
           <a:prstGeom prst="rect">
             <a:avLst/>
@@ -7442,14 +7442,14 @@
             <a:pPr algn="ctr"/>
             <a:r>
               <a:rPr lang="en-US" dirty="0"/>
-              <a:t>Base</a:t>
+              <a:t>Expected</a:t>
             </a:r>
           </a:p>
           <a:p>
             <a:pPr algn="ctr"/>
             <a:r>
               <a:rPr lang="en-US" dirty="0"/>
-              <a:t>editing</a:t>
+              <a:t>edit</a:t>
             </a:r>
           </a:p>
         </p:txBody>
@@ -7468,7 +7468,7 @@
         </p:nvSpPr>
         <p:spPr>
           <a:xfrm>
-            <a:off x="2717372" y="2114546"/>
+            <a:off x="2449294" y="1995177"/>
             <a:ext cx="1080813" cy="387927"/>
           </a:xfrm>
           <a:prstGeom prst="rect">
@@ -7506,7 +7506,7 @@
         </p:nvCxnSpPr>
         <p:spPr>
           <a:xfrm flipH="1">
-            <a:off x="11158789" y="4113072"/>
+            <a:off x="10890711" y="3993697"/>
             <a:ext cx="3" cy="341058"/>
           </a:xfrm>
           <a:prstGeom prst="straightConnector1">
@@ -7550,8 +7550,8 @@
         </p:nvCxnSpPr>
         <p:spPr>
           <a:xfrm>
-            <a:off x="2758805" y="74342"/>
-            <a:ext cx="0" cy="9375203"/>
+            <a:off x="2490721" y="-45030"/>
+            <a:ext cx="0" cy="5861763"/>
           </a:xfrm>
           <a:prstGeom prst="line">
             <a:avLst/>
@@ -7591,8 +7591,8 @@
         </p:nvSpPr>
         <p:spPr>
           <a:xfrm>
-            <a:off x="1498194" y="166089"/>
-            <a:ext cx="1336584" cy="646331"/>
+            <a:off x="1249346" y="47596"/>
+            <a:ext cx="1298112" cy="646331"/>
           </a:xfrm>
           <a:prstGeom prst="rect">
             <a:avLst/>
@@ -7607,14 +7607,14 @@
             <a:pPr algn="ctr"/>
             <a:r>
               <a:rPr lang="en-US" dirty="0"/>
-              <a:t>Base</a:t>
+              <a:t>Base editor </a:t>
             </a:r>
           </a:p>
           <a:p>
             <a:pPr algn="ctr"/>
             <a:r>
               <a:rPr lang="en-US" dirty="0"/>
-              <a:t>editor name</a:t>
+              <a:t>name</a:t>
             </a:r>
           </a:p>
         </p:txBody>
@@ -7633,7 +7633,7 @@
         </p:nvSpPr>
         <p:spPr>
           <a:xfrm>
-            <a:off x="1557271" y="2114546"/>
+            <a:off x="1289193" y="1995177"/>
             <a:ext cx="1080813" cy="387927"/>
           </a:xfrm>
           <a:prstGeom prst="rect">
@@ -7651,6 +7651,42 @@
             <a:r>
               <a:rPr lang="en-US" sz="1921" dirty="0"/>
               <a:t>BE4max</a:t>
+            </a:r>
+          </a:p>
+        </p:txBody>
+      </p:sp>
+      <p:sp>
+        <p:nvSpPr>
+          <p:cNvPr id="144" name="TextBox 143">
+            <a:extLst>
+              <a:ext uri="{FF2B5EF4-FFF2-40B4-BE49-F238E27FC236}">
+                <a16:creationId xmlns:a16="http://schemas.microsoft.com/office/drawing/2014/main" id="{B64C339A-BDD6-3145-9E6A-3F8308AAF70C}"/>
+              </a:ext>
+            </a:extLst>
+          </p:cNvPr>
+          <p:cNvSpPr txBox="1"/>
+          <p:nvPr/>
+        </p:nvSpPr>
+        <p:spPr>
+          <a:xfrm>
+            <a:off x="10827109" y="3969483"/>
+            <a:ext cx="1080813" cy="353943"/>
+          </a:xfrm>
+          <a:prstGeom prst="rect">
+            <a:avLst/>
+          </a:prstGeom>
+          <a:noFill/>
+        </p:spPr>
+        <p:txBody>
+          <a:bodyPr wrap="square" rtlCol="0">
+            <a:spAutoFit/>
+          </a:bodyPr>
+          <a:lstStyle/>
+          <a:p>
+            <a:pPr algn="ctr"/>
+            <a:r>
+              <a:rPr lang="en-US" sz="1700" dirty="0"/>
+              <a:t>Editing</a:t>
             </a:r>
           </a:p>
         </p:txBody>

</xml_diff>